<commit_message>
Ich will nicht mehr
</commit_message>
<xml_diff>
--- a/ITP/Von der Projektidee zum Projektauftrag.pptx
+++ b/ITP/Von der Projektidee zum Projektauftrag.pptx
@@ -5,7 +5,7 @@
     <p:sldMasterId id="2147483648" r:id="rId1"/>
   </p:sldMasterIdLst>
   <p:notesMasterIdLst>
-    <p:notesMasterId r:id="rId21"/>
+    <p:notesMasterId r:id="rId22"/>
   </p:notesMasterIdLst>
   <p:sldIdLst>
     <p:sldId id="256" r:id="rId2"/>
@@ -27,6 +27,7 @@
     <p:sldId id="277" r:id="rId18"/>
     <p:sldId id="276" r:id="rId19"/>
     <p:sldId id="278" r:id="rId20"/>
+    <p:sldId id="279" r:id="rId21"/>
   </p:sldIdLst>
   <p:sldSz cx="12192000" cy="6858000"/>
   <p:notesSz cx="6858000" cy="9144000"/>
@@ -215,7 +216,7 @@
           <a:p>
             <a:fld id="{D22B782B-7635-4CFD-8DEB-E3047850B87B}" type="datetimeFigureOut">
               <a:rPr lang="de-AT" smtClean="0"/>
-              <a:t>04.03.2025</a:t>
+              <a:t>05.03.2025</a:t>
             </a:fld>
             <a:endParaRPr lang="de-AT"/>
           </a:p>
@@ -1015,6 +1016,174 @@
 </p:notes>
 </file>
 
+<file path=ppt/notesSlides/notesSlide6.xml><?xml version="1.0" encoding="utf-8"?>
+<p:notes xmlns:a="http://schemas.openxmlformats.org/drawingml/2006/main" xmlns:r="http://schemas.openxmlformats.org/officeDocument/2006/relationships" xmlns:p="http://schemas.openxmlformats.org/presentationml/2006/main">
+  <p:cSld>
+    <p:spTree>
+      <p:nvGrpSpPr>
+        <p:cNvPr id="1" name=""/>
+        <p:cNvGrpSpPr/>
+        <p:nvPr/>
+      </p:nvGrpSpPr>
+      <p:grpSpPr>
+        <a:xfrm>
+          <a:off x="0" y="0"/>
+          <a:ext cx="0" cy="0"/>
+          <a:chOff x="0" y="0"/>
+          <a:chExt cx="0" cy="0"/>
+        </a:xfrm>
+      </p:grpSpPr>
+      <p:sp>
+        <p:nvSpPr>
+          <p:cNvPr id="2" name="Folienbildplatzhalter 1"/>
+          <p:cNvSpPr>
+            <a:spLocks noGrp="1" noRot="1" noChangeAspect="1"/>
+          </p:cNvSpPr>
+          <p:nvPr>
+            <p:ph type="sldImg"/>
+          </p:nvPr>
+        </p:nvSpPr>
+        <p:spPr/>
+      </p:sp>
+      <p:sp>
+        <p:nvSpPr>
+          <p:cNvPr id="3" name="Notizenplatzhalter 2"/>
+          <p:cNvSpPr>
+            <a:spLocks noGrp="1"/>
+          </p:cNvSpPr>
+          <p:nvPr>
+            <p:ph type="body" idx="1"/>
+          </p:nvPr>
+        </p:nvSpPr>
+        <p:spPr/>
+        <p:txBody>
+          <a:bodyPr/>
+          <a:lstStyle/>
+          <a:p>
+            <a:endParaRPr lang="de-AT" dirty="0"/>
+          </a:p>
+        </p:txBody>
+      </p:sp>
+      <p:sp>
+        <p:nvSpPr>
+          <p:cNvPr id="4" name="Foliennummernplatzhalter 3"/>
+          <p:cNvSpPr>
+            <a:spLocks noGrp="1"/>
+          </p:cNvSpPr>
+          <p:nvPr>
+            <p:ph type="sldNum" sz="quarter" idx="5"/>
+          </p:nvPr>
+        </p:nvSpPr>
+        <p:spPr/>
+        <p:txBody>
+          <a:bodyPr/>
+          <a:lstStyle/>
+          <a:p>
+            <a:fld id="{42F1E68F-BF1A-45B0-841D-982DA2AC4570}" type="slidenum">
+              <a:rPr lang="de-AT" smtClean="0"/>
+              <a:t>15</a:t>
+            </a:fld>
+            <a:endParaRPr lang="de-AT"/>
+          </a:p>
+        </p:txBody>
+      </p:sp>
+    </p:spTree>
+    <p:extLst>
+      <p:ext uri="{BB962C8B-B14F-4D97-AF65-F5344CB8AC3E}">
+        <p14:creationId xmlns:p14="http://schemas.microsoft.com/office/powerpoint/2010/main" val="1474704522"/>
+      </p:ext>
+    </p:extLst>
+  </p:cSld>
+  <p:clrMapOvr>
+    <a:masterClrMapping/>
+  </p:clrMapOvr>
+</p:notes>
+</file>
+
+<file path=ppt/notesSlides/notesSlide7.xml><?xml version="1.0" encoding="utf-8"?>
+<p:notes xmlns:a="http://schemas.openxmlformats.org/drawingml/2006/main" xmlns:r="http://schemas.openxmlformats.org/officeDocument/2006/relationships" xmlns:p="http://schemas.openxmlformats.org/presentationml/2006/main">
+  <p:cSld>
+    <p:spTree>
+      <p:nvGrpSpPr>
+        <p:cNvPr id="1" name=""/>
+        <p:cNvGrpSpPr/>
+        <p:nvPr/>
+      </p:nvGrpSpPr>
+      <p:grpSpPr>
+        <a:xfrm>
+          <a:off x="0" y="0"/>
+          <a:ext cx="0" cy="0"/>
+          <a:chOff x="0" y="0"/>
+          <a:chExt cx="0" cy="0"/>
+        </a:xfrm>
+      </p:grpSpPr>
+      <p:sp>
+        <p:nvSpPr>
+          <p:cNvPr id="2" name="Folienbildplatzhalter 1"/>
+          <p:cNvSpPr>
+            <a:spLocks noGrp="1" noRot="1" noChangeAspect="1"/>
+          </p:cNvSpPr>
+          <p:nvPr>
+            <p:ph type="sldImg"/>
+          </p:nvPr>
+        </p:nvSpPr>
+        <p:spPr/>
+      </p:sp>
+      <p:sp>
+        <p:nvSpPr>
+          <p:cNvPr id="3" name="Notizenplatzhalter 2"/>
+          <p:cNvSpPr>
+            <a:spLocks noGrp="1"/>
+          </p:cNvSpPr>
+          <p:nvPr>
+            <p:ph type="body" idx="1"/>
+          </p:nvPr>
+        </p:nvSpPr>
+        <p:spPr/>
+        <p:txBody>
+          <a:bodyPr/>
+          <a:lstStyle/>
+          <a:p>
+            <a:endParaRPr lang="de-AT" dirty="0"/>
+          </a:p>
+        </p:txBody>
+      </p:sp>
+      <p:sp>
+        <p:nvSpPr>
+          <p:cNvPr id="4" name="Foliennummernplatzhalter 3"/>
+          <p:cNvSpPr>
+            <a:spLocks noGrp="1"/>
+          </p:cNvSpPr>
+          <p:nvPr>
+            <p:ph type="sldNum" sz="quarter" idx="5"/>
+          </p:nvPr>
+        </p:nvSpPr>
+        <p:spPr/>
+        <p:txBody>
+          <a:bodyPr/>
+          <a:lstStyle/>
+          <a:p>
+            <a:fld id="{42F1E68F-BF1A-45B0-841D-982DA2AC4570}" type="slidenum">
+              <a:rPr lang="de-AT" smtClean="0"/>
+              <a:t>16</a:t>
+            </a:fld>
+            <a:endParaRPr lang="de-AT"/>
+          </a:p>
+        </p:txBody>
+      </p:sp>
+    </p:spTree>
+    <p:extLst>
+      <p:ext uri="{BB962C8B-B14F-4D97-AF65-F5344CB8AC3E}">
+        <p14:creationId xmlns:p14="http://schemas.microsoft.com/office/powerpoint/2010/main" val="3494633258"/>
+      </p:ext>
+    </p:extLst>
+  </p:cSld>
+  <p:clrMapOvr>
+    <a:masterClrMapping/>
+  </p:clrMapOvr>
+</p:notes>
+</file>
+
 <file path=ppt/slideLayouts/slideLayout1.xml><?xml version="1.0" encoding="utf-8"?>
 <p:sldLayout xmlns:a="http://schemas.openxmlformats.org/drawingml/2006/main" xmlns:r="http://schemas.openxmlformats.org/officeDocument/2006/relationships" xmlns:p="http://schemas.openxmlformats.org/presentationml/2006/main" type="title" preserve="1">
   <p:cSld name="Titelfolie">
@@ -1162,9 +1331,9 @@
           <a:bodyPr/>
           <a:lstStyle/>
           <a:p>
-            <a:fld id="{92B27164-6474-4D1E-8CCC-2157E74E8803}" type="datetimeFigureOut">
+            <a:fld id="{F4B13AFC-D0EF-42CA-A9E1-58A372A8B7DA}" type="datetime1">
               <a:rPr lang="en-GB" smtClean="0"/>
-              <a:t>04/03/2025</a:t>
+              <a:t>05/03/2025</a:t>
             </a:fld>
             <a:endParaRPr lang="en-GB"/>
           </a:p>
@@ -1362,9 +1531,9 @@
           <a:bodyPr/>
           <a:lstStyle/>
           <a:p>
-            <a:fld id="{92B27164-6474-4D1E-8CCC-2157E74E8803}" type="datetimeFigureOut">
+            <a:fld id="{D91BC2AF-CECD-41EB-91D8-FC814B19D2BB}" type="datetime1">
               <a:rPr lang="en-GB" smtClean="0"/>
-              <a:t>04/03/2025</a:t>
+              <a:t>05/03/2025</a:t>
             </a:fld>
             <a:endParaRPr lang="en-GB"/>
           </a:p>
@@ -1572,9 +1741,9 @@
           <a:bodyPr/>
           <a:lstStyle/>
           <a:p>
-            <a:fld id="{92B27164-6474-4D1E-8CCC-2157E74E8803}" type="datetimeFigureOut">
+            <a:fld id="{9825354E-F563-4111-BF58-E038845F1B7E}" type="datetime1">
               <a:rPr lang="en-GB" smtClean="0"/>
-              <a:t>04/03/2025</a:t>
+              <a:t>05/03/2025</a:t>
             </a:fld>
             <a:endParaRPr lang="en-GB"/>
           </a:p>
@@ -1772,9 +1941,9 @@
           <a:bodyPr/>
           <a:lstStyle/>
           <a:p>
-            <a:fld id="{92B27164-6474-4D1E-8CCC-2157E74E8803}" type="datetimeFigureOut">
+            <a:fld id="{B2E8A175-7921-478E-BE30-519E05C548DB}" type="datetime1">
               <a:rPr lang="en-GB" smtClean="0"/>
-              <a:t>04/03/2025</a:t>
+              <a:t>05/03/2025</a:t>
             </a:fld>
             <a:endParaRPr lang="en-GB"/>
           </a:p>
@@ -2048,9 +2217,9 @@
           <a:bodyPr/>
           <a:lstStyle/>
           <a:p>
-            <a:fld id="{92B27164-6474-4D1E-8CCC-2157E74E8803}" type="datetimeFigureOut">
+            <a:fld id="{0E9F0052-14E0-4315-85A1-03492097AA66}" type="datetime1">
               <a:rPr lang="en-GB" smtClean="0"/>
-              <a:t>04/03/2025</a:t>
+              <a:t>05/03/2025</a:t>
             </a:fld>
             <a:endParaRPr lang="en-GB"/>
           </a:p>
@@ -2316,9 +2485,9 @@
           <a:bodyPr/>
           <a:lstStyle/>
           <a:p>
-            <a:fld id="{92B27164-6474-4D1E-8CCC-2157E74E8803}" type="datetimeFigureOut">
+            <a:fld id="{9F578F3E-2837-4FC3-A98E-88409A1BA321}" type="datetime1">
               <a:rPr lang="en-GB" smtClean="0"/>
-              <a:t>04/03/2025</a:t>
+              <a:t>05/03/2025</a:t>
             </a:fld>
             <a:endParaRPr lang="en-GB"/>
           </a:p>
@@ -2731,9 +2900,9 @@
           <a:bodyPr/>
           <a:lstStyle/>
           <a:p>
-            <a:fld id="{92B27164-6474-4D1E-8CCC-2157E74E8803}" type="datetimeFigureOut">
+            <a:fld id="{DD8E2323-7188-4091-9719-693FAB1EE299}" type="datetime1">
               <a:rPr lang="en-GB" smtClean="0"/>
-              <a:t>04/03/2025</a:t>
+              <a:t>05/03/2025</a:t>
             </a:fld>
             <a:endParaRPr lang="en-GB"/>
           </a:p>
@@ -2873,9 +3042,9 @@
           <a:bodyPr/>
           <a:lstStyle/>
           <a:p>
-            <a:fld id="{92B27164-6474-4D1E-8CCC-2157E74E8803}" type="datetimeFigureOut">
+            <a:fld id="{03B07AAD-9123-458D-9073-B61A0EAD2087}" type="datetime1">
               <a:rPr lang="en-GB" smtClean="0"/>
-              <a:t>04/03/2025</a:t>
+              <a:t>05/03/2025</a:t>
             </a:fld>
             <a:endParaRPr lang="en-GB"/>
           </a:p>
@@ -2986,9 +3155,9 @@
           <a:bodyPr/>
           <a:lstStyle/>
           <a:p>
-            <a:fld id="{92B27164-6474-4D1E-8CCC-2157E74E8803}" type="datetimeFigureOut">
+            <a:fld id="{1D1E95BF-9BCF-4C35-929E-D3124F7D5CDC}" type="datetime1">
               <a:rPr lang="en-GB" smtClean="0"/>
-              <a:t>04/03/2025</a:t>
+              <a:t>05/03/2025</a:t>
             </a:fld>
             <a:endParaRPr lang="en-GB"/>
           </a:p>
@@ -3299,9 +3468,9 @@
           <a:bodyPr/>
           <a:lstStyle/>
           <a:p>
-            <a:fld id="{92B27164-6474-4D1E-8CCC-2157E74E8803}" type="datetimeFigureOut">
+            <a:fld id="{CA6077BB-E0EC-46B9-9FE5-7928F75384FA}" type="datetime1">
               <a:rPr lang="en-GB" smtClean="0"/>
-              <a:t>04/03/2025</a:t>
+              <a:t>05/03/2025</a:t>
             </a:fld>
             <a:endParaRPr lang="en-GB"/>
           </a:p>
@@ -3588,9 +3757,9 @@
           <a:bodyPr/>
           <a:lstStyle/>
           <a:p>
-            <a:fld id="{92B27164-6474-4D1E-8CCC-2157E74E8803}" type="datetimeFigureOut">
+            <a:fld id="{1F4A9EC9-4DB4-4BE4-A4EA-242B40676557}" type="datetime1">
               <a:rPr lang="en-GB" smtClean="0"/>
-              <a:t>04/03/2025</a:t>
+              <a:t>05/03/2025</a:t>
             </a:fld>
             <a:endParaRPr lang="en-GB"/>
           </a:p>
@@ -3831,9 +4000,9 @@
             </a:lvl1pPr>
           </a:lstStyle>
           <a:p>
-            <a:fld id="{92B27164-6474-4D1E-8CCC-2157E74E8803}" type="datetimeFigureOut">
+            <a:fld id="{CA0D09B7-194B-45C4-ABD1-A6D48D52B8B9}" type="datetime1">
               <a:rPr lang="en-GB" smtClean="0"/>
-              <a:t>04/03/2025</a:t>
+              <a:t>05/03/2025</a:t>
             </a:fld>
             <a:endParaRPr lang="en-GB"/>
           </a:p>
@@ -3950,6 +4119,7 @@
     <p:sldLayoutId id="2147483658" r:id="rId10"/>
     <p:sldLayoutId id="2147483659" r:id="rId11"/>
   </p:sldLayoutIdLst>
+  <p:hf hdr="0" ftr="0" dt="0"/>
   <p:txStyles>
     <p:titleStyle>
       <a:lvl1pPr algn="l" defTabSz="914400" rtl="0" eaLnBrk="1" latinLnBrk="0" hangingPunct="1">
@@ -4838,6 +5008,35 @@
           </a:p>
         </p:txBody>
       </p:sp>
+      <p:sp>
+        <p:nvSpPr>
+          <p:cNvPr id="4" name="Foliennummernplatzhalter 3">
+            <a:extLst>
+              <a:ext uri="{FF2B5EF4-FFF2-40B4-BE49-F238E27FC236}">
+                <a16:creationId xmlns:a16="http://schemas.microsoft.com/office/drawing/2014/main" id="{FBE36111-3DBA-DAAB-77F7-8788F7EDE1CF}"/>
+              </a:ext>
+            </a:extLst>
+          </p:cNvPr>
+          <p:cNvSpPr>
+            <a:spLocks noGrp="1"/>
+          </p:cNvSpPr>
+          <p:nvPr>
+            <p:ph type="sldNum" sz="quarter" idx="12"/>
+          </p:nvPr>
+        </p:nvSpPr>
+        <p:spPr/>
+        <p:txBody>
+          <a:bodyPr/>
+          <a:lstStyle/>
+          <a:p>
+            <a:fld id="{1A401315-7350-4ECF-B456-363AC987C71C}" type="slidenum">
+              <a:rPr lang="en-GB" sz="1600" smtClean="0"/>
+              <a:t>1</a:t>
+            </a:fld>
+            <a:endParaRPr lang="en-GB" dirty="0"/>
+          </a:p>
+        </p:txBody>
+      </p:sp>
     </p:spTree>
     <p:extLst>
       <p:ext uri="{BB962C8B-B14F-4D97-AF65-F5344CB8AC3E}">
@@ -5266,6 +5465,35 @@
           </a:prstGeom>
         </p:spPr>
       </p:pic>
+      <p:sp>
+        <p:nvSpPr>
+          <p:cNvPr id="3" name="Foliennummernplatzhalter 2">
+            <a:extLst>
+              <a:ext uri="{FF2B5EF4-FFF2-40B4-BE49-F238E27FC236}">
+                <a16:creationId xmlns:a16="http://schemas.microsoft.com/office/drawing/2014/main" id="{BB5BF4A6-E404-ACE7-C528-0FD2604FF500}"/>
+              </a:ext>
+            </a:extLst>
+          </p:cNvPr>
+          <p:cNvSpPr>
+            <a:spLocks noGrp="1"/>
+          </p:cNvSpPr>
+          <p:nvPr>
+            <p:ph type="sldNum" sz="quarter" idx="12"/>
+          </p:nvPr>
+        </p:nvSpPr>
+        <p:spPr/>
+        <p:txBody>
+          <a:bodyPr/>
+          <a:lstStyle/>
+          <a:p>
+            <a:fld id="{1A401315-7350-4ECF-B456-363AC987C71C}" type="slidenum">
+              <a:rPr lang="en-GB" smtClean="0"/>
+              <a:t>10</a:t>
+            </a:fld>
+            <a:endParaRPr lang="en-GB"/>
+          </a:p>
+        </p:txBody>
+      </p:sp>
     </p:spTree>
     <p:extLst>
       <p:ext uri="{BB962C8B-B14F-4D97-AF65-F5344CB8AC3E}">
@@ -5276,6 +5504,486 @@
   <p:clrMapOvr>
     <a:masterClrMapping/>
   </p:clrMapOvr>
+  <p:transition spd="slow">
+    <p:push dir="u"/>
+  </p:transition>
+  <p:timing>
+    <p:tnLst>
+      <p:par>
+        <p:cTn id="1" dur="indefinite" restart="never" nodeType="tmRoot">
+          <p:childTnLst>
+            <p:seq concurrent="1" nextAc="seek">
+              <p:cTn id="2" dur="indefinite" nodeType="mainSeq">
+                <p:childTnLst>
+                  <p:par>
+                    <p:cTn id="3" fill="hold">
+                      <p:stCondLst>
+                        <p:cond delay="indefinite"/>
+                      </p:stCondLst>
+                      <p:childTnLst>
+                        <p:par>
+                          <p:cTn id="4" fill="hold">
+                            <p:stCondLst>
+                              <p:cond delay="0"/>
+                            </p:stCondLst>
+                            <p:childTnLst>
+                              <p:par>
+                                <p:cTn id="5" presetID="10" presetClass="entr" presetSubtype="0" fill="hold" grpId="0" nodeType="clickEffect">
+                                  <p:stCondLst>
+                                    <p:cond delay="0"/>
+                                  </p:stCondLst>
+                                  <p:childTnLst>
+                                    <p:set>
+                                      <p:cBhvr>
+                                        <p:cTn id="6" dur="1" fill="hold">
+                                          <p:stCondLst>
+                                            <p:cond delay="0"/>
+                                          </p:stCondLst>
+                                        </p:cTn>
+                                        <p:tgtEl>
+                                          <p:spTgt spid="4"/>
+                                        </p:tgtEl>
+                                        <p:attrNameLst>
+                                          <p:attrName>style.visibility</p:attrName>
+                                        </p:attrNameLst>
+                                      </p:cBhvr>
+                                      <p:to>
+                                        <p:strVal val="visible"/>
+                                      </p:to>
+                                    </p:set>
+                                    <p:animEffect transition="in" filter="fade">
+                                      <p:cBhvr>
+                                        <p:cTn id="7" dur="500"/>
+                                        <p:tgtEl>
+                                          <p:spTgt spid="4"/>
+                                        </p:tgtEl>
+                                      </p:cBhvr>
+                                    </p:animEffect>
+                                  </p:childTnLst>
+                                </p:cTn>
+                              </p:par>
+                              <p:par>
+                                <p:cTn id="8" presetID="10" presetClass="entr" presetSubtype="0" fill="hold" nodeType="withEffect">
+                                  <p:stCondLst>
+                                    <p:cond delay="0"/>
+                                  </p:stCondLst>
+                                  <p:childTnLst>
+                                    <p:set>
+                                      <p:cBhvr>
+                                        <p:cTn id="9" dur="1" fill="hold">
+                                          <p:stCondLst>
+                                            <p:cond delay="0"/>
+                                          </p:stCondLst>
+                                        </p:cTn>
+                                        <p:tgtEl>
+                                          <p:spTgt spid="4098"/>
+                                        </p:tgtEl>
+                                        <p:attrNameLst>
+                                          <p:attrName>style.visibility</p:attrName>
+                                        </p:attrNameLst>
+                                      </p:cBhvr>
+                                      <p:to>
+                                        <p:strVal val="visible"/>
+                                      </p:to>
+                                    </p:set>
+                                    <p:animEffect transition="in" filter="fade">
+                                      <p:cBhvr>
+                                        <p:cTn id="10" dur="500"/>
+                                        <p:tgtEl>
+                                          <p:spTgt spid="4098"/>
+                                        </p:tgtEl>
+                                      </p:cBhvr>
+                                    </p:animEffect>
+                                  </p:childTnLst>
+                                </p:cTn>
+                              </p:par>
+                            </p:childTnLst>
+                          </p:cTn>
+                        </p:par>
+                      </p:childTnLst>
+                    </p:cTn>
+                  </p:par>
+                  <p:par>
+                    <p:cTn id="11" fill="hold">
+                      <p:stCondLst>
+                        <p:cond delay="indefinite"/>
+                      </p:stCondLst>
+                      <p:childTnLst>
+                        <p:par>
+                          <p:cTn id="12" fill="hold">
+                            <p:stCondLst>
+                              <p:cond delay="0"/>
+                            </p:stCondLst>
+                            <p:childTnLst>
+                              <p:par>
+                                <p:cTn id="13" presetID="10" presetClass="entr" presetSubtype="0" fill="hold" grpId="0" nodeType="clickEffect">
+                                  <p:stCondLst>
+                                    <p:cond delay="0"/>
+                                  </p:stCondLst>
+                                  <p:childTnLst>
+                                    <p:set>
+                                      <p:cBhvr>
+                                        <p:cTn id="14" dur="1" fill="hold">
+                                          <p:stCondLst>
+                                            <p:cond delay="0"/>
+                                          </p:stCondLst>
+                                        </p:cTn>
+                                        <p:tgtEl>
+                                          <p:spTgt spid="6"/>
+                                        </p:tgtEl>
+                                        <p:attrNameLst>
+                                          <p:attrName>style.visibility</p:attrName>
+                                        </p:attrNameLst>
+                                      </p:cBhvr>
+                                      <p:to>
+                                        <p:strVal val="visible"/>
+                                      </p:to>
+                                    </p:set>
+                                    <p:animEffect transition="in" filter="fade">
+                                      <p:cBhvr>
+                                        <p:cTn id="15" dur="500"/>
+                                        <p:tgtEl>
+                                          <p:spTgt spid="6"/>
+                                        </p:tgtEl>
+                                      </p:cBhvr>
+                                    </p:animEffect>
+                                  </p:childTnLst>
+                                </p:cTn>
+                              </p:par>
+                              <p:par>
+                                <p:cTn id="16" presetID="10" presetClass="entr" presetSubtype="0" fill="hold" nodeType="withEffect">
+                                  <p:stCondLst>
+                                    <p:cond delay="0"/>
+                                  </p:stCondLst>
+                                  <p:childTnLst>
+                                    <p:set>
+                                      <p:cBhvr>
+                                        <p:cTn id="17" dur="1" fill="hold">
+                                          <p:stCondLst>
+                                            <p:cond delay="0"/>
+                                          </p:stCondLst>
+                                        </p:cTn>
+                                        <p:tgtEl>
+                                          <p:spTgt spid="12"/>
+                                        </p:tgtEl>
+                                        <p:attrNameLst>
+                                          <p:attrName>style.visibility</p:attrName>
+                                        </p:attrNameLst>
+                                      </p:cBhvr>
+                                      <p:to>
+                                        <p:strVal val="visible"/>
+                                      </p:to>
+                                    </p:set>
+                                    <p:animEffect transition="in" filter="fade">
+                                      <p:cBhvr>
+                                        <p:cTn id="18" dur="500"/>
+                                        <p:tgtEl>
+                                          <p:spTgt spid="12"/>
+                                        </p:tgtEl>
+                                      </p:cBhvr>
+                                    </p:animEffect>
+                                  </p:childTnLst>
+                                </p:cTn>
+                              </p:par>
+                            </p:childTnLst>
+                          </p:cTn>
+                        </p:par>
+                      </p:childTnLst>
+                    </p:cTn>
+                  </p:par>
+                  <p:par>
+                    <p:cTn id="19" fill="hold">
+                      <p:stCondLst>
+                        <p:cond delay="indefinite"/>
+                      </p:stCondLst>
+                      <p:childTnLst>
+                        <p:par>
+                          <p:cTn id="20" fill="hold">
+                            <p:stCondLst>
+                              <p:cond delay="0"/>
+                            </p:stCondLst>
+                            <p:childTnLst>
+                              <p:par>
+                                <p:cTn id="21" presetID="10" presetClass="entr" presetSubtype="0" fill="hold" grpId="0" nodeType="clickEffect">
+                                  <p:stCondLst>
+                                    <p:cond delay="0"/>
+                                  </p:stCondLst>
+                                  <p:childTnLst>
+                                    <p:set>
+                                      <p:cBhvr>
+                                        <p:cTn id="22" dur="1" fill="hold">
+                                          <p:stCondLst>
+                                            <p:cond delay="0"/>
+                                          </p:stCondLst>
+                                        </p:cTn>
+                                        <p:tgtEl>
+                                          <p:spTgt spid="7"/>
+                                        </p:tgtEl>
+                                        <p:attrNameLst>
+                                          <p:attrName>style.visibility</p:attrName>
+                                        </p:attrNameLst>
+                                      </p:cBhvr>
+                                      <p:to>
+                                        <p:strVal val="visible"/>
+                                      </p:to>
+                                    </p:set>
+                                    <p:animEffect transition="in" filter="fade">
+                                      <p:cBhvr>
+                                        <p:cTn id="23" dur="500"/>
+                                        <p:tgtEl>
+                                          <p:spTgt spid="7"/>
+                                        </p:tgtEl>
+                                      </p:cBhvr>
+                                    </p:animEffect>
+                                  </p:childTnLst>
+                                </p:cTn>
+                              </p:par>
+                              <p:par>
+                                <p:cTn id="24" presetID="10" presetClass="entr" presetSubtype="0" fill="hold" nodeType="withEffect">
+                                  <p:stCondLst>
+                                    <p:cond delay="0"/>
+                                  </p:stCondLst>
+                                  <p:childTnLst>
+                                    <p:set>
+                                      <p:cBhvr>
+                                        <p:cTn id="25" dur="1" fill="hold">
+                                          <p:stCondLst>
+                                            <p:cond delay="0"/>
+                                          </p:stCondLst>
+                                        </p:cTn>
+                                        <p:tgtEl>
+                                          <p:spTgt spid="4100"/>
+                                        </p:tgtEl>
+                                        <p:attrNameLst>
+                                          <p:attrName>style.visibility</p:attrName>
+                                        </p:attrNameLst>
+                                      </p:cBhvr>
+                                      <p:to>
+                                        <p:strVal val="visible"/>
+                                      </p:to>
+                                    </p:set>
+                                    <p:animEffect transition="in" filter="fade">
+                                      <p:cBhvr>
+                                        <p:cTn id="26" dur="500"/>
+                                        <p:tgtEl>
+                                          <p:spTgt spid="4100"/>
+                                        </p:tgtEl>
+                                      </p:cBhvr>
+                                    </p:animEffect>
+                                  </p:childTnLst>
+                                </p:cTn>
+                              </p:par>
+                            </p:childTnLst>
+                          </p:cTn>
+                        </p:par>
+                      </p:childTnLst>
+                    </p:cTn>
+                  </p:par>
+                  <p:par>
+                    <p:cTn id="27" fill="hold">
+                      <p:stCondLst>
+                        <p:cond delay="indefinite"/>
+                      </p:stCondLst>
+                      <p:childTnLst>
+                        <p:par>
+                          <p:cTn id="28" fill="hold">
+                            <p:stCondLst>
+                              <p:cond delay="0"/>
+                            </p:stCondLst>
+                            <p:childTnLst>
+                              <p:par>
+                                <p:cTn id="29" presetID="10" presetClass="entr" presetSubtype="0" fill="hold" grpId="0" nodeType="clickEffect">
+                                  <p:stCondLst>
+                                    <p:cond delay="0"/>
+                                  </p:stCondLst>
+                                  <p:childTnLst>
+                                    <p:set>
+                                      <p:cBhvr>
+                                        <p:cTn id="30" dur="1" fill="hold">
+                                          <p:stCondLst>
+                                            <p:cond delay="0"/>
+                                          </p:stCondLst>
+                                        </p:cTn>
+                                        <p:tgtEl>
+                                          <p:spTgt spid="5"/>
+                                        </p:tgtEl>
+                                        <p:attrNameLst>
+                                          <p:attrName>style.visibility</p:attrName>
+                                        </p:attrNameLst>
+                                      </p:cBhvr>
+                                      <p:to>
+                                        <p:strVal val="visible"/>
+                                      </p:to>
+                                    </p:set>
+                                    <p:animEffect transition="in" filter="fade">
+                                      <p:cBhvr>
+                                        <p:cTn id="31" dur="500"/>
+                                        <p:tgtEl>
+                                          <p:spTgt spid="5"/>
+                                        </p:tgtEl>
+                                      </p:cBhvr>
+                                    </p:animEffect>
+                                  </p:childTnLst>
+                                </p:cTn>
+                              </p:par>
+                              <p:par>
+                                <p:cTn id="32" presetID="10" presetClass="entr" presetSubtype="0" fill="hold" nodeType="withEffect">
+                                  <p:stCondLst>
+                                    <p:cond delay="0"/>
+                                  </p:stCondLst>
+                                  <p:childTnLst>
+                                    <p:set>
+                                      <p:cBhvr>
+                                        <p:cTn id="33" dur="1" fill="hold">
+                                          <p:stCondLst>
+                                            <p:cond delay="0"/>
+                                          </p:stCondLst>
+                                        </p:cTn>
+                                        <p:tgtEl>
+                                          <p:spTgt spid="14"/>
+                                        </p:tgtEl>
+                                        <p:attrNameLst>
+                                          <p:attrName>style.visibility</p:attrName>
+                                        </p:attrNameLst>
+                                      </p:cBhvr>
+                                      <p:to>
+                                        <p:strVal val="visible"/>
+                                      </p:to>
+                                    </p:set>
+                                    <p:animEffect transition="in" filter="fade">
+                                      <p:cBhvr>
+                                        <p:cTn id="34" dur="500"/>
+                                        <p:tgtEl>
+                                          <p:spTgt spid="14"/>
+                                        </p:tgtEl>
+                                      </p:cBhvr>
+                                    </p:animEffect>
+                                  </p:childTnLst>
+                                </p:cTn>
+                              </p:par>
+                            </p:childTnLst>
+                          </p:cTn>
+                        </p:par>
+                      </p:childTnLst>
+                    </p:cTn>
+                  </p:par>
+                  <p:par>
+                    <p:cTn id="35" fill="hold">
+                      <p:stCondLst>
+                        <p:cond delay="indefinite"/>
+                      </p:stCondLst>
+                      <p:childTnLst>
+                        <p:par>
+                          <p:cTn id="36" fill="hold">
+                            <p:stCondLst>
+                              <p:cond delay="0"/>
+                            </p:stCondLst>
+                            <p:childTnLst>
+                              <p:par>
+                                <p:cTn id="37" presetID="10" presetClass="entr" presetSubtype="0" fill="hold" grpId="0" nodeType="clickEffect">
+                                  <p:stCondLst>
+                                    <p:cond delay="0"/>
+                                  </p:stCondLst>
+                                  <p:childTnLst>
+                                    <p:set>
+                                      <p:cBhvr>
+                                        <p:cTn id="38" dur="1" fill="hold">
+                                          <p:stCondLst>
+                                            <p:cond delay="0"/>
+                                          </p:stCondLst>
+                                        </p:cTn>
+                                        <p:tgtEl>
+                                          <p:spTgt spid="8"/>
+                                        </p:tgtEl>
+                                        <p:attrNameLst>
+                                          <p:attrName>style.visibility</p:attrName>
+                                        </p:attrNameLst>
+                                      </p:cBhvr>
+                                      <p:to>
+                                        <p:strVal val="visible"/>
+                                      </p:to>
+                                    </p:set>
+                                    <p:animEffect transition="in" filter="fade">
+                                      <p:cBhvr>
+                                        <p:cTn id="39" dur="500"/>
+                                        <p:tgtEl>
+                                          <p:spTgt spid="8"/>
+                                        </p:tgtEl>
+                                      </p:cBhvr>
+                                    </p:animEffect>
+                                  </p:childTnLst>
+                                </p:cTn>
+                              </p:par>
+                              <p:par>
+                                <p:cTn id="40" presetID="10" presetClass="entr" presetSubtype="0" fill="hold" nodeType="withEffect">
+                                  <p:stCondLst>
+                                    <p:cond delay="0"/>
+                                  </p:stCondLst>
+                                  <p:childTnLst>
+                                    <p:set>
+                                      <p:cBhvr>
+                                        <p:cTn id="41" dur="1" fill="hold">
+                                          <p:stCondLst>
+                                            <p:cond delay="0"/>
+                                          </p:stCondLst>
+                                        </p:cTn>
+                                        <p:tgtEl>
+                                          <p:spTgt spid="10"/>
+                                        </p:tgtEl>
+                                        <p:attrNameLst>
+                                          <p:attrName>style.visibility</p:attrName>
+                                        </p:attrNameLst>
+                                      </p:cBhvr>
+                                      <p:to>
+                                        <p:strVal val="visible"/>
+                                      </p:to>
+                                    </p:set>
+                                    <p:animEffect transition="in" filter="fade">
+                                      <p:cBhvr>
+                                        <p:cTn id="42" dur="500"/>
+                                        <p:tgtEl>
+                                          <p:spTgt spid="10"/>
+                                        </p:tgtEl>
+                                      </p:cBhvr>
+                                    </p:animEffect>
+                                  </p:childTnLst>
+                                </p:cTn>
+                              </p:par>
+                            </p:childTnLst>
+                          </p:cTn>
+                        </p:par>
+                      </p:childTnLst>
+                    </p:cTn>
+                  </p:par>
+                </p:childTnLst>
+              </p:cTn>
+              <p:prevCondLst>
+                <p:cond evt="onPrev" delay="0">
+                  <p:tgtEl>
+                    <p:sldTgt/>
+                  </p:tgtEl>
+                </p:cond>
+              </p:prevCondLst>
+              <p:nextCondLst>
+                <p:cond evt="onNext" delay="0">
+                  <p:tgtEl>
+                    <p:sldTgt/>
+                  </p:tgtEl>
+                </p:cond>
+              </p:nextCondLst>
+            </p:seq>
+          </p:childTnLst>
+        </p:cTn>
+      </p:par>
+    </p:tnLst>
+    <p:bldLst>
+      <p:bldP spid="4" grpId="0"/>
+      <p:bldP spid="5" grpId="0"/>
+      <p:bldP spid="6" grpId="0"/>
+      <p:bldP spid="7" grpId="0"/>
+      <p:bldP spid="8" grpId="0"/>
+    </p:bldLst>
+  </p:timing>
 </p:sld>
 </file>
 
@@ -5533,6 +6241,35 @@
           </a:p>
         </p:txBody>
       </p:sp>
+      <p:sp>
+        <p:nvSpPr>
+          <p:cNvPr id="3" name="Foliennummernplatzhalter 2">
+            <a:extLst>
+              <a:ext uri="{FF2B5EF4-FFF2-40B4-BE49-F238E27FC236}">
+                <a16:creationId xmlns:a16="http://schemas.microsoft.com/office/drawing/2014/main" id="{D9223243-A397-AE58-2CF6-E5DBA1A2D86C}"/>
+              </a:ext>
+            </a:extLst>
+          </p:cNvPr>
+          <p:cNvSpPr>
+            <a:spLocks noGrp="1"/>
+          </p:cNvSpPr>
+          <p:nvPr>
+            <p:ph type="sldNum" sz="quarter" idx="12"/>
+          </p:nvPr>
+        </p:nvSpPr>
+        <p:spPr/>
+        <p:txBody>
+          <a:bodyPr/>
+          <a:lstStyle/>
+          <a:p>
+            <a:fld id="{1A401315-7350-4ECF-B456-363AC987C71C}" type="slidenum">
+              <a:rPr lang="en-GB" smtClean="0"/>
+              <a:t>11</a:t>
+            </a:fld>
+            <a:endParaRPr lang="en-GB"/>
+          </a:p>
+        </p:txBody>
+      </p:sp>
     </p:spTree>
     <p:extLst>
       <p:ext uri="{BB962C8B-B14F-4D97-AF65-F5344CB8AC3E}">
@@ -5543,6 +6280,326 @@
   <p:clrMapOvr>
     <a:masterClrMapping/>
   </p:clrMapOvr>
+  <p:transition spd="slow">
+    <p:push dir="r"/>
+  </p:transition>
+  <p:timing>
+    <p:tnLst>
+      <p:par>
+        <p:cTn id="1" dur="indefinite" restart="never" nodeType="tmRoot">
+          <p:childTnLst>
+            <p:seq concurrent="1" nextAc="seek">
+              <p:cTn id="2" dur="indefinite" nodeType="mainSeq">
+                <p:childTnLst>
+                  <p:par>
+                    <p:cTn id="3" fill="hold">
+                      <p:stCondLst>
+                        <p:cond delay="indefinite"/>
+                      </p:stCondLst>
+                      <p:childTnLst>
+                        <p:par>
+                          <p:cTn id="4" fill="hold">
+                            <p:stCondLst>
+                              <p:cond delay="0"/>
+                            </p:stCondLst>
+                            <p:childTnLst>
+                              <p:par>
+                                <p:cTn id="5" presetID="10" presetClass="entr" presetSubtype="0" fill="hold" nodeType="clickEffect">
+                                  <p:stCondLst>
+                                    <p:cond delay="0"/>
+                                  </p:stCondLst>
+                                  <p:childTnLst>
+                                    <p:set>
+                                      <p:cBhvr>
+                                        <p:cTn id="6" dur="1" fill="hold">
+                                          <p:stCondLst>
+                                            <p:cond delay="0"/>
+                                          </p:stCondLst>
+                                        </p:cTn>
+                                        <p:tgtEl>
+                                          <p:spTgt spid="5"/>
+                                        </p:tgtEl>
+                                        <p:attrNameLst>
+                                          <p:attrName>style.visibility</p:attrName>
+                                        </p:attrNameLst>
+                                      </p:cBhvr>
+                                      <p:to>
+                                        <p:strVal val="visible"/>
+                                      </p:to>
+                                    </p:set>
+                                    <p:animEffect transition="in" filter="fade">
+                                      <p:cBhvr>
+                                        <p:cTn id="7" dur="500"/>
+                                        <p:tgtEl>
+                                          <p:spTgt spid="5"/>
+                                        </p:tgtEl>
+                                      </p:cBhvr>
+                                    </p:animEffect>
+                                  </p:childTnLst>
+                                </p:cTn>
+                              </p:par>
+                              <p:par>
+                                <p:cTn id="8" presetID="10" presetClass="entr" presetSubtype="0" fill="hold" grpId="0" nodeType="withEffect">
+                                  <p:stCondLst>
+                                    <p:cond delay="0"/>
+                                  </p:stCondLst>
+                                  <p:childTnLst>
+                                    <p:set>
+                                      <p:cBhvr>
+                                        <p:cTn id="9" dur="1" fill="hold">
+                                          <p:stCondLst>
+                                            <p:cond delay="0"/>
+                                          </p:stCondLst>
+                                        </p:cTn>
+                                        <p:tgtEl>
+                                          <p:spTgt spid="10"/>
+                                        </p:tgtEl>
+                                        <p:attrNameLst>
+                                          <p:attrName>style.visibility</p:attrName>
+                                        </p:attrNameLst>
+                                      </p:cBhvr>
+                                      <p:to>
+                                        <p:strVal val="visible"/>
+                                      </p:to>
+                                    </p:set>
+                                    <p:animEffect transition="in" filter="fade">
+                                      <p:cBhvr>
+                                        <p:cTn id="10" dur="500"/>
+                                        <p:tgtEl>
+                                          <p:spTgt spid="10"/>
+                                        </p:tgtEl>
+                                      </p:cBhvr>
+                                    </p:animEffect>
+                                  </p:childTnLst>
+                                </p:cTn>
+                              </p:par>
+                            </p:childTnLst>
+                          </p:cTn>
+                        </p:par>
+                      </p:childTnLst>
+                    </p:cTn>
+                  </p:par>
+                  <p:par>
+                    <p:cTn id="11" fill="hold">
+                      <p:stCondLst>
+                        <p:cond delay="indefinite"/>
+                      </p:stCondLst>
+                      <p:childTnLst>
+                        <p:par>
+                          <p:cTn id="12" fill="hold">
+                            <p:stCondLst>
+                              <p:cond delay="0"/>
+                            </p:stCondLst>
+                            <p:childTnLst>
+                              <p:par>
+                                <p:cTn id="13" presetID="10" presetClass="entr" presetSubtype="0" fill="hold" nodeType="clickEffect">
+                                  <p:stCondLst>
+                                    <p:cond delay="0"/>
+                                  </p:stCondLst>
+                                  <p:childTnLst>
+                                    <p:set>
+                                      <p:cBhvr>
+                                        <p:cTn id="14" dur="1" fill="hold">
+                                          <p:stCondLst>
+                                            <p:cond delay="0"/>
+                                          </p:stCondLst>
+                                        </p:cTn>
+                                        <p:tgtEl>
+                                          <p:spTgt spid="7"/>
+                                        </p:tgtEl>
+                                        <p:attrNameLst>
+                                          <p:attrName>style.visibility</p:attrName>
+                                        </p:attrNameLst>
+                                      </p:cBhvr>
+                                      <p:to>
+                                        <p:strVal val="visible"/>
+                                      </p:to>
+                                    </p:set>
+                                    <p:animEffect transition="in" filter="fade">
+                                      <p:cBhvr>
+                                        <p:cTn id="15" dur="500"/>
+                                        <p:tgtEl>
+                                          <p:spTgt spid="7"/>
+                                        </p:tgtEl>
+                                      </p:cBhvr>
+                                    </p:animEffect>
+                                  </p:childTnLst>
+                                </p:cTn>
+                              </p:par>
+                            </p:childTnLst>
+                          </p:cTn>
+                        </p:par>
+                      </p:childTnLst>
+                    </p:cTn>
+                  </p:par>
+                  <p:par>
+                    <p:cTn id="16" fill="hold">
+                      <p:stCondLst>
+                        <p:cond delay="indefinite"/>
+                      </p:stCondLst>
+                      <p:childTnLst>
+                        <p:par>
+                          <p:cTn id="17" fill="hold">
+                            <p:stCondLst>
+                              <p:cond delay="0"/>
+                            </p:stCondLst>
+                            <p:childTnLst>
+                              <p:par>
+                                <p:cTn id="18" presetID="10" presetClass="entr" presetSubtype="0" fill="hold" grpId="0" nodeType="clickEffect">
+                                  <p:stCondLst>
+                                    <p:cond delay="0"/>
+                                  </p:stCondLst>
+                                  <p:childTnLst>
+                                    <p:set>
+                                      <p:cBhvr>
+                                        <p:cTn id="19" dur="1" fill="hold">
+                                          <p:stCondLst>
+                                            <p:cond delay="0"/>
+                                          </p:stCondLst>
+                                        </p:cTn>
+                                        <p:tgtEl>
+                                          <p:spTgt spid="12"/>
+                                        </p:tgtEl>
+                                        <p:attrNameLst>
+                                          <p:attrName>style.visibility</p:attrName>
+                                        </p:attrNameLst>
+                                      </p:cBhvr>
+                                      <p:to>
+                                        <p:strVal val="visible"/>
+                                      </p:to>
+                                    </p:set>
+                                    <p:animEffect transition="in" filter="fade">
+                                      <p:cBhvr>
+                                        <p:cTn id="20" dur="500"/>
+                                        <p:tgtEl>
+                                          <p:spTgt spid="12"/>
+                                        </p:tgtEl>
+                                      </p:cBhvr>
+                                    </p:animEffect>
+                                  </p:childTnLst>
+                                </p:cTn>
+                              </p:par>
+                            </p:childTnLst>
+                          </p:cTn>
+                        </p:par>
+                      </p:childTnLst>
+                    </p:cTn>
+                  </p:par>
+                  <p:par>
+                    <p:cTn id="21" fill="hold">
+                      <p:stCondLst>
+                        <p:cond delay="indefinite"/>
+                      </p:stCondLst>
+                      <p:childTnLst>
+                        <p:par>
+                          <p:cTn id="22" fill="hold">
+                            <p:stCondLst>
+                              <p:cond delay="0"/>
+                            </p:stCondLst>
+                            <p:childTnLst>
+                              <p:par>
+                                <p:cTn id="23" presetID="10" presetClass="entr" presetSubtype="0" fill="hold" nodeType="clickEffect">
+                                  <p:stCondLst>
+                                    <p:cond delay="0"/>
+                                  </p:stCondLst>
+                                  <p:childTnLst>
+                                    <p:set>
+                                      <p:cBhvr>
+                                        <p:cTn id="24" dur="1" fill="hold">
+                                          <p:stCondLst>
+                                            <p:cond delay="0"/>
+                                          </p:stCondLst>
+                                        </p:cTn>
+                                        <p:tgtEl>
+                                          <p:spTgt spid="9"/>
+                                        </p:tgtEl>
+                                        <p:attrNameLst>
+                                          <p:attrName>style.visibility</p:attrName>
+                                        </p:attrNameLst>
+                                      </p:cBhvr>
+                                      <p:to>
+                                        <p:strVal val="visible"/>
+                                      </p:to>
+                                    </p:set>
+                                    <p:animEffect transition="in" filter="fade">
+                                      <p:cBhvr>
+                                        <p:cTn id="25" dur="500"/>
+                                        <p:tgtEl>
+                                          <p:spTgt spid="9"/>
+                                        </p:tgtEl>
+                                      </p:cBhvr>
+                                    </p:animEffect>
+                                  </p:childTnLst>
+                                </p:cTn>
+                              </p:par>
+                              <p:par>
+                                <p:cTn id="26" presetID="10" presetClass="entr" presetSubtype="0" fill="hold" grpId="0" nodeType="withEffect">
+                                  <p:stCondLst>
+                                    <p:cond delay="0"/>
+                                  </p:stCondLst>
+                                  <p:childTnLst>
+                                    <p:set>
+                                      <p:cBhvr>
+                                        <p:cTn id="27" dur="1" fill="hold">
+                                          <p:stCondLst>
+                                            <p:cond delay="0"/>
+                                          </p:stCondLst>
+                                        </p:cTn>
+                                        <p:tgtEl>
+                                          <p:spTgt spid="13"/>
+                                        </p:tgtEl>
+                                        <p:attrNameLst>
+                                          <p:attrName>style.visibility</p:attrName>
+                                        </p:attrNameLst>
+                                      </p:cBhvr>
+                                      <p:to>
+                                        <p:strVal val="visible"/>
+                                      </p:to>
+                                    </p:set>
+                                    <p:animEffect transition="in" filter="fade">
+                                      <p:cBhvr>
+                                        <p:cTn id="28" dur="500"/>
+                                        <p:tgtEl>
+                                          <p:spTgt spid="13"/>
+                                        </p:tgtEl>
+                                      </p:cBhvr>
+                                    </p:animEffect>
+                                  </p:childTnLst>
+                                </p:cTn>
+                              </p:par>
+                            </p:childTnLst>
+                          </p:cTn>
+                        </p:par>
+                      </p:childTnLst>
+                    </p:cTn>
+                  </p:par>
+                </p:childTnLst>
+              </p:cTn>
+              <p:prevCondLst>
+                <p:cond evt="onPrev" delay="0">
+                  <p:tgtEl>
+                    <p:sldTgt/>
+                  </p:tgtEl>
+                </p:cond>
+              </p:prevCondLst>
+              <p:nextCondLst>
+                <p:cond evt="onNext" delay="0">
+                  <p:tgtEl>
+                    <p:sldTgt/>
+                  </p:tgtEl>
+                </p:cond>
+              </p:nextCondLst>
+            </p:seq>
+          </p:childTnLst>
+        </p:cTn>
+      </p:par>
+    </p:tnLst>
+    <p:bldLst>
+      <p:bldP spid="10" grpId="0"/>
+      <p:bldP spid="12" grpId="0"/>
+      <p:bldP spid="13" grpId="0"/>
+    </p:bldLst>
+  </p:timing>
 </p:sld>
 </file>
 
@@ -5627,6 +6684,35 @@
           </a:prstGeom>
         </p:spPr>
       </p:pic>
+      <p:sp>
+        <p:nvSpPr>
+          <p:cNvPr id="3" name="Foliennummernplatzhalter 2">
+            <a:extLst>
+              <a:ext uri="{FF2B5EF4-FFF2-40B4-BE49-F238E27FC236}">
+                <a16:creationId xmlns:a16="http://schemas.microsoft.com/office/drawing/2014/main" id="{20A180FE-4D8E-1B2A-169A-0FEB404EB3F5}"/>
+              </a:ext>
+            </a:extLst>
+          </p:cNvPr>
+          <p:cNvSpPr>
+            <a:spLocks noGrp="1"/>
+          </p:cNvSpPr>
+          <p:nvPr>
+            <p:ph type="sldNum" sz="quarter" idx="12"/>
+          </p:nvPr>
+        </p:nvSpPr>
+        <p:spPr/>
+        <p:txBody>
+          <a:bodyPr/>
+          <a:lstStyle/>
+          <a:p>
+            <a:fld id="{1A401315-7350-4ECF-B456-363AC987C71C}" type="slidenum">
+              <a:rPr lang="en-GB" smtClean="0"/>
+              <a:t>12</a:t>
+            </a:fld>
+            <a:endParaRPr lang="en-GB"/>
+          </a:p>
+        </p:txBody>
+      </p:sp>
     </p:spTree>
     <p:extLst>
       <p:ext uri="{BB962C8B-B14F-4D97-AF65-F5344CB8AC3E}">
@@ -5637,6 +6723,9 @@
   <p:clrMapOvr>
     <a:masterClrMapping/>
   </p:clrMapOvr>
+  <p:transition spd="slow">
+    <p:push dir="r"/>
+  </p:transition>
 </p:sld>
 </file>
 
@@ -6127,6 +7216,35 @@
           </a:p>
         </p:txBody>
       </p:sp>
+      <p:sp>
+        <p:nvSpPr>
+          <p:cNvPr id="3" name="Foliennummernplatzhalter 2">
+            <a:extLst>
+              <a:ext uri="{FF2B5EF4-FFF2-40B4-BE49-F238E27FC236}">
+                <a16:creationId xmlns:a16="http://schemas.microsoft.com/office/drawing/2014/main" id="{B5147559-4073-AC45-73CB-A7EEEB6F70B8}"/>
+              </a:ext>
+            </a:extLst>
+          </p:cNvPr>
+          <p:cNvSpPr>
+            <a:spLocks noGrp="1"/>
+          </p:cNvSpPr>
+          <p:nvPr>
+            <p:ph type="sldNum" sz="quarter" idx="12"/>
+          </p:nvPr>
+        </p:nvSpPr>
+        <p:spPr/>
+        <p:txBody>
+          <a:bodyPr/>
+          <a:lstStyle/>
+          <a:p>
+            <a:fld id="{1A401315-7350-4ECF-B456-363AC987C71C}" type="slidenum">
+              <a:rPr lang="en-GB" smtClean="0"/>
+              <a:t>13</a:t>
+            </a:fld>
+            <a:endParaRPr lang="en-GB"/>
+          </a:p>
+        </p:txBody>
+      </p:sp>
     </p:spTree>
     <p:extLst>
       <p:ext uri="{BB962C8B-B14F-4D97-AF65-F5344CB8AC3E}">
@@ -6227,6 +7345,35 @@
           </a:prstGeom>
         </p:spPr>
       </p:pic>
+      <p:sp>
+        <p:nvSpPr>
+          <p:cNvPr id="4" name="Foliennummernplatzhalter 3">
+            <a:extLst>
+              <a:ext uri="{FF2B5EF4-FFF2-40B4-BE49-F238E27FC236}">
+                <a16:creationId xmlns:a16="http://schemas.microsoft.com/office/drawing/2014/main" id="{BA6291B3-46AA-C7EB-BA74-3DCE7D4B62AC}"/>
+              </a:ext>
+            </a:extLst>
+          </p:cNvPr>
+          <p:cNvSpPr>
+            <a:spLocks noGrp="1"/>
+          </p:cNvSpPr>
+          <p:nvPr>
+            <p:ph type="sldNum" sz="quarter" idx="12"/>
+          </p:nvPr>
+        </p:nvSpPr>
+        <p:spPr/>
+        <p:txBody>
+          <a:bodyPr/>
+          <a:lstStyle/>
+          <a:p>
+            <a:fld id="{1A401315-7350-4ECF-B456-363AC987C71C}" type="slidenum">
+              <a:rPr lang="en-GB" smtClean="0"/>
+              <a:t>14</a:t>
+            </a:fld>
+            <a:endParaRPr lang="en-GB"/>
+          </a:p>
+        </p:txBody>
+      </p:sp>
     </p:spTree>
     <p:extLst>
       <p:ext uri="{BB962C8B-B14F-4D97-AF65-F5344CB8AC3E}">
@@ -6237,6 +7384,9 @@
   <p:clrMapOvr>
     <a:masterClrMapping/>
   </p:clrMapOvr>
+  <p:transition spd="slow">
+    <p:push dir="u"/>
+  </p:transition>
 </p:sld>
 </file>
 
@@ -6338,7 +7488,7 @@
           <p:nvPr/>
         </p:nvPicPr>
         <p:blipFill>
-          <a:blip r:embed="rId2"/>
+          <a:blip r:embed="rId3"/>
           <a:stretch>
             <a:fillRect/>
           </a:stretch>
@@ -6368,7 +7518,7 @@
           <p:nvPr/>
         </p:nvPicPr>
         <p:blipFill>
-          <a:blip r:embed="rId3"/>
+          <a:blip r:embed="rId4"/>
           <a:stretch>
             <a:fillRect/>
           </a:stretch>
@@ -6398,7 +7548,7 @@
           <p:nvPr/>
         </p:nvPicPr>
         <p:blipFill>
-          <a:blip r:embed="rId4"/>
+          <a:blip r:embed="rId5"/>
           <a:stretch>
             <a:fillRect/>
           </a:stretch>
@@ -6524,6 +7674,35 @@
           </a:p>
         </p:txBody>
       </p:sp>
+      <p:sp>
+        <p:nvSpPr>
+          <p:cNvPr id="4" name="Foliennummernplatzhalter 3">
+            <a:extLst>
+              <a:ext uri="{FF2B5EF4-FFF2-40B4-BE49-F238E27FC236}">
+                <a16:creationId xmlns:a16="http://schemas.microsoft.com/office/drawing/2014/main" id="{BF291867-B06A-AD15-4065-D4A3F2CDDB36}"/>
+              </a:ext>
+            </a:extLst>
+          </p:cNvPr>
+          <p:cNvSpPr>
+            <a:spLocks noGrp="1"/>
+          </p:cNvSpPr>
+          <p:nvPr>
+            <p:ph type="sldNum" sz="quarter" idx="12"/>
+          </p:nvPr>
+        </p:nvSpPr>
+        <p:spPr/>
+        <p:txBody>
+          <a:bodyPr/>
+          <a:lstStyle/>
+          <a:p>
+            <a:fld id="{1A401315-7350-4ECF-B456-363AC987C71C}" type="slidenum">
+              <a:rPr lang="en-GB" smtClean="0"/>
+              <a:t>15</a:t>
+            </a:fld>
+            <a:endParaRPr lang="en-GB"/>
+          </a:p>
+        </p:txBody>
+      </p:sp>
     </p:spTree>
     <p:extLst>
       <p:ext uri="{BB962C8B-B14F-4D97-AF65-F5344CB8AC3E}">
@@ -6534,6 +7713,9 @@
   <p:clrMapOvr>
     <a:masterClrMapping/>
   </p:clrMapOvr>
+  <p:transition spd="slow">
+    <p:push dir="u"/>
+  </p:transition>
 </p:sld>
 </file>
 
@@ -6936,14 +8118,14 @@
           <p:nvPr/>
         </p:nvPicPr>
         <p:blipFill>
-          <a:blip r:embed="rId2"/>
+          <a:blip r:embed="rId3"/>
           <a:stretch>
             <a:fillRect/>
           </a:stretch>
         </p:blipFill>
         <p:spPr>
           <a:xfrm>
-            <a:off x="2245954" y="1835765"/>
+            <a:off x="2346090" y="1881082"/>
             <a:ext cx="1074635" cy="1074635"/>
           </a:xfrm>
           <a:prstGeom prst="rect">
@@ -6966,14 +8148,14 @@
           <p:nvPr/>
         </p:nvPicPr>
         <p:blipFill>
-          <a:blip r:embed="rId3"/>
+          <a:blip r:embed="rId4"/>
           <a:stretch>
             <a:fillRect/>
           </a:stretch>
         </p:blipFill>
         <p:spPr>
           <a:xfrm>
-            <a:off x="5675650" y="1924057"/>
+            <a:off x="5642122" y="1908322"/>
             <a:ext cx="1074634" cy="1074634"/>
           </a:xfrm>
           <a:prstGeom prst="rect">
@@ -6996,7 +8178,7 @@
           <p:nvPr/>
         </p:nvPicPr>
         <p:blipFill>
-          <a:blip r:embed="rId4"/>
+          <a:blip r:embed="rId5"/>
           <a:stretch>
             <a:fillRect/>
           </a:stretch>
@@ -7026,14 +8208,14 @@
           <p:nvPr/>
         </p:nvPicPr>
         <p:blipFill>
-          <a:blip r:embed="rId5"/>
+          <a:blip r:embed="rId6"/>
           <a:stretch>
             <a:fillRect/>
           </a:stretch>
         </p:blipFill>
         <p:spPr>
           <a:xfrm>
-            <a:off x="2090354" y="3468699"/>
+            <a:off x="2237613" y="3438517"/>
             <a:ext cx="1196340" cy="1196340"/>
           </a:xfrm>
           <a:prstGeom prst="rect">
@@ -7056,7 +8238,7 @@
           <p:nvPr/>
         </p:nvPicPr>
         <p:blipFill>
-          <a:blip r:embed="rId6"/>
+          <a:blip r:embed="rId7"/>
           <a:stretch>
             <a:fillRect/>
           </a:stretch>
@@ -7086,14 +8268,14 @@
           <p:nvPr/>
         </p:nvPicPr>
         <p:blipFill>
-          <a:blip r:embed="rId7"/>
+          <a:blip r:embed="rId8"/>
           <a:stretch>
             <a:fillRect/>
           </a:stretch>
         </p:blipFill>
         <p:spPr>
           <a:xfrm>
-            <a:off x="2090354" y="5172151"/>
+            <a:off x="2274951" y="5095417"/>
             <a:ext cx="1121664" cy="1121664"/>
           </a:xfrm>
           <a:prstGeom prst="rect">
@@ -7116,14 +8298,14 @@
           <p:nvPr/>
         </p:nvPicPr>
         <p:blipFill>
-          <a:blip r:embed="rId8"/>
+          <a:blip r:embed="rId9"/>
           <a:stretch>
             <a:fillRect/>
           </a:stretch>
         </p:blipFill>
         <p:spPr>
           <a:xfrm>
-            <a:off x="5758761" y="5172151"/>
+            <a:off x="5698228" y="5157128"/>
             <a:ext cx="1131678" cy="1131678"/>
           </a:xfrm>
           <a:prstGeom prst="rect">
@@ -7146,7 +8328,7 @@
           <p:nvPr/>
         </p:nvPicPr>
         <p:blipFill>
-          <a:blip r:embed="rId9"/>
+          <a:blip r:embed="rId10"/>
           <a:stretch>
             <a:fillRect/>
           </a:stretch>
@@ -7176,14 +8358,14 @@
           <p:nvPr/>
         </p:nvPicPr>
         <p:blipFill>
-          <a:blip r:embed="rId10"/>
+          <a:blip r:embed="rId11"/>
           <a:stretch>
             <a:fillRect/>
           </a:stretch>
         </p:blipFill>
         <p:spPr>
           <a:xfrm>
-            <a:off x="5584685" y="3425730"/>
+            <a:off x="5662421" y="3375127"/>
             <a:ext cx="1196341" cy="1196341"/>
           </a:xfrm>
           <a:prstGeom prst="rect">
@@ -7191,6 +8373,35 @@
           </a:prstGeom>
         </p:spPr>
       </p:pic>
+      <p:sp>
+        <p:nvSpPr>
+          <p:cNvPr id="3" name="Foliennummernplatzhalter 2">
+            <a:extLst>
+              <a:ext uri="{FF2B5EF4-FFF2-40B4-BE49-F238E27FC236}">
+                <a16:creationId xmlns:a16="http://schemas.microsoft.com/office/drawing/2014/main" id="{FAA7553E-8B05-2ADF-A3EC-0AD266F36ACC}"/>
+              </a:ext>
+            </a:extLst>
+          </p:cNvPr>
+          <p:cNvSpPr>
+            <a:spLocks noGrp="1"/>
+          </p:cNvSpPr>
+          <p:nvPr>
+            <p:ph type="sldNum" sz="quarter" idx="12"/>
+          </p:nvPr>
+        </p:nvSpPr>
+        <p:spPr/>
+        <p:txBody>
+          <a:bodyPr/>
+          <a:lstStyle/>
+          <a:p>
+            <a:fld id="{1A401315-7350-4ECF-B456-363AC987C71C}" type="slidenum">
+              <a:rPr lang="en-GB" smtClean="0"/>
+              <a:t>16</a:t>
+            </a:fld>
+            <a:endParaRPr lang="en-GB"/>
+          </a:p>
+        </p:txBody>
+      </p:sp>
     </p:spTree>
     <p:extLst>
       <p:ext uri="{BB962C8B-B14F-4D97-AF65-F5344CB8AC3E}">
@@ -7201,6 +8412,734 @@
   <p:clrMapOvr>
     <a:masterClrMapping/>
   </p:clrMapOvr>
+  <p:transition spd="slow">
+    <p:push/>
+  </p:transition>
+  <p:timing>
+    <p:tnLst>
+      <p:par>
+        <p:cTn id="1" dur="indefinite" restart="never" nodeType="tmRoot">
+          <p:childTnLst>
+            <p:seq concurrent="1" nextAc="seek">
+              <p:cTn id="2" dur="indefinite" nodeType="mainSeq">
+                <p:childTnLst>
+                  <p:par>
+                    <p:cTn id="3" fill="hold">
+                      <p:stCondLst>
+                        <p:cond delay="indefinite"/>
+                      </p:stCondLst>
+                      <p:childTnLst>
+                        <p:par>
+                          <p:cTn id="4" fill="hold">
+                            <p:stCondLst>
+                              <p:cond delay="0"/>
+                            </p:stCondLst>
+                            <p:childTnLst>
+                              <p:par>
+                                <p:cTn id="5" presetID="10" presetClass="entr" presetSubtype="0" fill="hold" grpId="0" nodeType="clickEffect">
+                                  <p:stCondLst>
+                                    <p:cond delay="0"/>
+                                  </p:stCondLst>
+                                  <p:childTnLst>
+                                    <p:set>
+                                      <p:cBhvr>
+                                        <p:cTn id="6" dur="1" fill="hold">
+                                          <p:stCondLst>
+                                            <p:cond delay="0"/>
+                                          </p:stCondLst>
+                                        </p:cTn>
+                                        <p:tgtEl>
+                                          <p:spTgt spid="4"/>
+                                        </p:tgtEl>
+                                        <p:attrNameLst>
+                                          <p:attrName>style.visibility</p:attrName>
+                                        </p:attrNameLst>
+                                      </p:cBhvr>
+                                      <p:to>
+                                        <p:strVal val="visible"/>
+                                      </p:to>
+                                    </p:set>
+                                    <p:animEffect transition="in" filter="fade">
+                                      <p:cBhvr>
+                                        <p:cTn id="7" dur="500"/>
+                                        <p:tgtEl>
+                                          <p:spTgt spid="4"/>
+                                        </p:tgtEl>
+                                      </p:cBhvr>
+                                    </p:animEffect>
+                                  </p:childTnLst>
+                                </p:cTn>
+                              </p:par>
+                              <p:par>
+                                <p:cTn id="8" presetID="10" presetClass="entr" presetSubtype="0" fill="hold" grpId="0" nodeType="withEffect">
+                                  <p:stCondLst>
+                                    <p:cond delay="0"/>
+                                  </p:stCondLst>
+                                  <p:childTnLst>
+                                    <p:set>
+                                      <p:cBhvr>
+                                        <p:cTn id="9" dur="1" fill="hold">
+                                          <p:stCondLst>
+                                            <p:cond delay="0"/>
+                                          </p:stCondLst>
+                                        </p:cTn>
+                                        <p:tgtEl>
+                                          <p:spTgt spid="6"/>
+                                        </p:tgtEl>
+                                        <p:attrNameLst>
+                                          <p:attrName>style.visibility</p:attrName>
+                                        </p:attrNameLst>
+                                      </p:cBhvr>
+                                      <p:to>
+                                        <p:strVal val="visible"/>
+                                      </p:to>
+                                    </p:set>
+                                    <p:animEffect transition="in" filter="fade">
+                                      <p:cBhvr>
+                                        <p:cTn id="10" dur="500"/>
+                                        <p:tgtEl>
+                                          <p:spTgt spid="6"/>
+                                        </p:tgtEl>
+                                      </p:cBhvr>
+                                    </p:animEffect>
+                                  </p:childTnLst>
+                                </p:cTn>
+                              </p:par>
+                              <p:par>
+                                <p:cTn id="11" presetID="10" presetClass="entr" presetSubtype="0" fill="hold" grpId="0" nodeType="withEffect">
+                                  <p:stCondLst>
+                                    <p:cond delay="0"/>
+                                  </p:stCondLst>
+                                  <p:childTnLst>
+                                    <p:set>
+                                      <p:cBhvr>
+                                        <p:cTn id="12" dur="1" fill="hold">
+                                          <p:stCondLst>
+                                            <p:cond delay="0"/>
+                                          </p:stCondLst>
+                                        </p:cTn>
+                                        <p:tgtEl>
+                                          <p:spTgt spid="7"/>
+                                        </p:tgtEl>
+                                        <p:attrNameLst>
+                                          <p:attrName>style.visibility</p:attrName>
+                                        </p:attrNameLst>
+                                      </p:cBhvr>
+                                      <p:to>
+                                        <p:strVal val="visible"/>
+                                      </p:to>
+                                    </p:set>
+                                    <p:animEffect transition="in" filter="fade">
+                                      <p:cBhvr>
+                                        <p:cTn id="13" dur="500"/>
+                                        <p:tgtEl>
+                                          <p:spTgt spid="7"/>
+                                        </p:tgtEl>
+                                      </p:cBhvr>
+                                    </p:animEffect>
+                                  </p:childTnLst>
+                                </p:cTn>
+                              </p:par>
+                              <p:par>
+                                <p:cTn id="14" presetID="10" presetClass="entr" presetSubtype="0" fill="hold" nodeType="withEffect">
+                                  <p:stCondLst>
+                                    <p:cond delay="0"/>
+                                  </p:stCondLst>
+                                  <p:childTnLst>
+                                    <p:set>
+                                      <p:cBhvr>
+                                        <p:cTn id="15" dur="1" fill="hold">
+                                          <p:stCondLst>
+                                            <p:cond delay="0"/>
+                                          </p:stCondLst>
+                                        </p:cTn>
+                                        <p:tgtEl>
+                                          <p:spTgt spid="15"/>
+                                        </p:tgtEl>
+                                        <p:attrNameLst>
+                                          <p:attrName>style.visibility</p:attrName>
+                                        </p:attrNameLst>
+                                      </p:cBhvr>
+                                      <p:to>
+                                        <p:strVal val="visible"/>
+                                      </p:to>
+                                    </p:set>
+                                    <p:animEffect transition="in" filter="fade">
+                                      <p:cBhvr>
+                                        <p:cTn id="16" dur="500"/>
+                                        <p:tgtEl>
+                                          <p:spTgt spid="15"/>
+                                        </p:tgtEl>
+                                      </p:cBhvr>
+                                    </p:animEffect>
+                                  </p:childTnLst>
+                                </p:cTn>
+                              </p:par>
+                              <p:par>
+                                <p:cTn id="17" presetID="10" presetClass="entr" presetSubtype="0" fill="hold" nodeType="withEffect">
+                                  <p:stCondLst>
+                                    <p:cond delay="0"/>
+                                  </p:stCondLst>
+                                  <p:childTnLst>
+                                    <p:set>
+                                      <p:cBhvr>
+                                        <p:cTn id="18" dur="1" fill="hold">
+                                          <p:stCondLst>
+                                            <p:cond delay="0"/>
+                                          </p:stCondLst>
+                                        </p:cTn>
+                                        <p:tgtEl>
+                                          <p:spTgt spid="19"/>
+                                        </p:tgtEl>
+                                        <p:attrNameLst>
+                                          <p:attrName>style.visibility</p:attrName>
+                                        </p:attrNameLst>
+                                      </p:cBhvr>
+                                      <p:to>
+                                        <p:strVal val="visible"/>
+                                      </p:to>
+                                    </p:set>
+                                    <p:animEffect transition="in" filter="fade">
+                                      <p:cBhvr>
+                                        <p:cTn id="19" dur="500"/>
+                                        <p:tgtEl>
+                                          <p:spTgt spid="19"/>
+                                        </p:tgtEl>
+                                      </p:cBhvr>
+                                    </p:animEffect>
+                                  </p:childTnLst>
+                                </p:cTn>
+                              </p:par>
+                              <p:par>
+                                <p:cTn id="20" presetID="10" presetClass="entr" presetSubtype="0" fill="hold" nodeType="withEffect">
+                                  <p:stCondLst>
+                                    <p:cond delay="0"/>
+                                  </p:stCondLst>
+                                  <p:childTnLst>
+                                    <p:set>
+                                      <p:cBhvr>
+                                        <p:cTn id="21" dur="1" fill="hold">
+                                          <p:stCondLst>
+                                            <p:cond delay="0"/>
+                                          </p:stCondLst>
+                                        </p:cTn>
+                                        <p:tgtEl>
+                                          <p:spTgt spid="21"/>
+                                        </p:tgtEl>
+                                        <p:attrNameLst>
+                                          <p:attrName>style.visibility</p:attrName>
+                                        </p:attrNameLst>
+                                      </p:cBhvr>
+                                      <p:to>
+                                        <p:strVal val="visible"/>
+                                      </p:to>
+                                    </p:set>
+                                    <p:animEffect transition="in" filter="fade">
+                                      <p:cBhvr>
+                                        <p:cTn id="22" dur="500"/>
+                                        <p:tgtEl>
+                                          <p:spTgt spid="21"/>
+                                        </p:tgtEl>
+                                      </p:cBhvr>
+                                    </p:animEffect>
+                                  </p:childTnLst>
+                                </p:cTn>
+                              </p:par>
+                            </p:childTnLst>
+                          </p:cTn>
+                        </p:par>
+                      </p:childTnLst>
+                    </p:cTn>
+                  </p:par>
+                  <p:par>
+                    <p:cTn id="23" fill="hold">
+                      <p:stCondLst>
+                        <p:cond delay="indefinite"/>
+                      </p:stCondLst>
+                      <p:childTnLst>
+                        <p:par>
+                          <p:cTn id="24" fill="hold">
+                            <p:stCondLst>
+                              <p:cond delay="0"/>
+                            </p:stCondLst>
+                            <p:childTnLst>
+                              <p:par>
+                                <p:cTn id="25" presetID="10" presetClass="entr" presetSubtype="0" fill="hold" grpId="0" nodeType="clickEffect">
+                                  <p:stCondLst>
+                                    <p:cond delay="0"/>
+                                  </p:stCondLst>
+                                  <p:childTnLst>
+                                    <p:set>
+                                      <p:cBhvr>
+                                        <p:cTn id="26" dur="1" fill="hold">
+                                          <p:stCondLst>
+                                            <p:cond delay="0"/>
+                                          </p:stCondLst>
+                                        </p:cTn>
+                                        <p:tgtEl>
+                                          <p:spTgt spid="8"/>
+                                        </p:tgtEl>
+                                        <p:attrNameLst>
+                                          <p:attrName>style.visibility</p:attrName>
+                                        </p:attrNameLst>
+                                      </p:cBhvr>
+                                      <p:to>
+                                        <p:strVal val="visible"/>
+                                      </p:to>
+                                    </p:set>
+                                    <p:animEffect transition="in" filter="fade">
+                                      <p:cBhvr>
+                                        <p:cTn id="27" dur="500"/>
+                                        <p:tgtEl>
+                                          <p:spTgt spid="8"/>
+                                        </p:tgtEl>
+                                      </p:cBhvr>
+                                    </p:animEffect>
+                                  </p:childTnLst>
+                                </p:cTn>
+                              </p:par>
+                              <p:par>
+                                <p:cTn id="28" presetID="10" presetClass="entr" presetSubtype="0" fill="hold" grpId="0" nodeType="withEffect">
+                                  <p:stCondLst>
+                                    <p:cond delay="0"/>
+                                  </p:stCondLst>
+                                  <p:childTnLst>
+                                    <p:set>
+                                      <p:cBhvr>
+                                        <p:cTn id="29" dur="1" fill="hold">
+                                          <p:stCondLst>
+                                            <p:cond delay="0"/>
+                                          </p:stCondLst>
+                                        </p:cTn>
+                                        <p:tgtEl>
+                                          <p:spTgt spid="9"/>
+                                        </p:tgtEl>
+                                        <p:attrNameLst>
+                                          <p:attrName>style.visibility</p:attrName>
+                                        </p:attrNameLst>
+                                      </p:cBhvr>
+                                      <p:to>
+                                        <p:strVal val="visible"/>
+                                      </p:to>
+                                    </p:set>
+                                    <p:animEffect transition="in" filter="fade">
+                                      <p:cBhvr>
+                                        <p:cTn id="30" dur="500"/>
+                                        <p:tgtEl>
+                                          <p:spTgt spid="9"/>
+                                        </p:tgtEl>
+                                      </p:cBhvr>
+                                    </p:animEffect>
+                                  </p:childTnLst>
+                                </p:cTn>
+                              </p:par>
+                              <p:par>
+                                <p:cTn id="31" presetID="10" presetClass="entr" presetSubtype="0" fill="hold" grpId="0" nodeType="withEffect">
+                                  <p:stCondLst>
+                                    <p:cond delay="0"/>
+                                  </p:stCondLst>
+                                  <p:childTnLst>
+                                    <p:set>
+                                      <p:cBhvr>
+                                        <p:cTn id="32" dur="1" fill="hold">
+                                          <p:stCondLst>
+                                            <p:cond delay="0"/>
+                                          </p:stCondLst>
+                                        </p:cTn>
+                                        <p:tgtEl>
+                                          <p:spTgt spid="10"/>
+                                        </p:tgtEl>
+                                        <p:attrNameLst>
+                                          <p:attrName>style.visibility</p:attrName>
+                                        </p:attrNameLst>
+                                      </p:cBhvr>
+                                      <p:to>
+                                        <p:strVal val="visible"/>
+                                      </p:to>
+                                    </p:set>
+                                    <p:animEffect transition="in" filter="fade">
+                                      <p:cBhvr>
+                                        <p:cTn id="33" dur="500"/>
+                                        <p:tgtEl>
+                                          <p:spTgt spid="10"/>
+                                        </p:tgtEl>
+                                      </p:cBhvr>
+                                    </p:animEffect>
+                                  </p:childTnLst>
+                                </p:cTn>
+                              </p:par>
+                              <p:par>
+                                <p:cTn id="34" presetID="10" presetClass="entr" presetSubtype="0" fill="hold" nodeType="withEffect">
+                                  <p:stCondLst>
+                                    <p:cond delay="0"/>
+                                  </p:stCondLst>
+                                  <p:childTnLst>
+                                    <p:set>
+                                      <p:cBhvr>
+                                        <p:cTn id="35" dur="1" fill="hold">
+                                          <p:stCondLst>
+                                            <p:cond delay="0"/>
+                                          </p:stCondLst>
+                                        </p:cTn>
+                                        <p:tgtEl>
+                                          <p:spTgt spid="23"/>
+                                        </p:tgtEl>
+                                        <p:attrNameLst>
+                                          <p:attrName>style.visibility</p:attrName>
+                                        </p:attrNameLst>
+                                      </p:cBhvr>
+                                      <p:to>
+                                        <p:strVal val="visible"/>
+                                      </p:to>
+                                    </p:set>
+                                    <p:animEffect transition="in" filter="fade">
+                                      <p:cBhvr>
+                                        <p:cTn id="36" dur="500"/>
+                                        <p:tgtEl>
+                                          <p:spTgt spid="23"/>
+                                        </p:tgtEl>
+                                      </p:cBhvr>
+                                    </p:animEffect>
+                                  </p:childTnLst>
+                                </p:cTn>
+                              </p:par>
+                              <p:par>
+                                <p:cTn id="37" presetID="10" presetClass="entr" presetSubtype="0" fill="hold" nodeType="withEffect">
+                                  <p:stCondLst>
+                                    <p:cond delay="0"/>
+                                  </p:stCondLst>
+                                  <p:childTnLst>
+                                    <p:set>
+                                      <p:cBhvr>
+                                        <p:cTn id="38" dur="1" fill="hold">
+                                          <p:stCondLst>
+                                            <p:cond delay="0"/>
+                                          </p:stCondLst>
+                                        </p:cTn>
+                                        <p:tgtEl>
+                                          <p:spTgt spid="27"/>
+                                        </p:tgtEl>
+                                        <p:attrNameLst>
+                                          <p:attrName>style.visibility</p:attrName>
+                                        </p:attrNameLst>
+                                      </p:cBhvr>
+                                      <p:to>
+                                        <p:strVal val="visible"/>
+                                      </p:to>
+                                    </p:set>
+                                    <p:animEffect transition="in" filter="fade">
+                                      <p:cBhvr>
+                                        <p:cTn id="39" dur="500"/>
+                                        <p:tgtEl>
+                                          <p:spTgt spid="27"/>
+                                        </p:tgtEl>
+                                      </p:cBhvr>
+                                    </p:animEffect>
+                                  </p:childTnLst>
+                                </p:cTn>
+                              </p:par>
+                              <p:par>
+                                <p:cTn id="40" presetID="10" presetClass="entr" presetSubtype="0" fill="hold" nodeType="withEffect">
+                                  <p:stCondLst>
+                                    <p:cond delay="0"/>
+                                  </p:stCondLst>
+                                  <p:childTnLst>
+                                    <p:set>
+                                      <p:cBhvr>
+                                        <p:cTn id="41" dur="1" fill="hold">
+                                          <p:stCondLst>
+                                            <p:cond delay="0"/>
+                                          </p:stCondLst>
+                                        </p:cTn>
+                                        <p:tgtEl>
+                                          <p:spTgt spid="35"/>
+                                        </p:tgtEl>
+                                        <p:attrNameLst>
+                                          <p:attrName>style.visibility</p:attrName>
+                                        </p:attrNameLst>
+                                      </p:cBhvr>
+                                      <p:to>
+                                        <p:strVal val="visible"/>
+                                      </p:to>
+                                    </p:set>
+                                    <p:animEffect transition="in" filter="fade">
+                                      <p:cBhvr>
+                                        <p:cTn id="42" dur="500"/>
+                                        <p:tgtEl>
+                                          <p:spTgt spid="35"/>
+                                        </p:tgtEl>
+                                      </p:cBhvr>
+                                    </p:animEffect>
+                                  </p:childTnLst>
+                                </p:cTn>
+                              </p:par>
+                            </p:childTnLst>
+                          </p:cTn>
+                        </p:par>
+                      </p:childTnLst>
+                    </p:cTn>
+                  </p:par>
+                  <p:par>
+                    <p:cTn id="43" fill="hold">
+                      <p:stCondLst>
+                        <p:cond delay="indefinite"/>
+                      </p:stCondLst>
+                      <p:childTnLst>
+                        <p:par>
+                          <p:cTn id="44" fill="hold">
+                            <p:stCondLst>
+                              <p:cond delay="0"/>
+                            </p:stCondLst>
+                            <p:childTnLst>
+                              <p:par>
+                                <p:cTn id="45" presetID="10" presetClass="entr" presetSubtype="0" fill="hold" grpId="0" nodeType="clickEffect">
+                                  <p:stCondLst>
+                                    <p:cond delay="0"/>
+                                  </p:stCondLst>
+                                  <p:childTnLst>
+                                    <p:set>
+                                      <p:cBhvr>
+                                        <p:cTn id="46" dur="1" fill="hold">
+                                          <p:stCondLst>
+                                            <p:cond delay="0"/>
+                                          </p:stCondLst>
+                                        </p:cTn>
+                                        <p:tgtEl>
+                                          <p:spTgt spid="11"/>
+                                        </p:tgtEl>
+                                        <p:attrNameLst>
+                                          <p:attrName>style.visibility</p:attrName>
+                                        </p:attrNameLst>
+                                      </p:cBhvr>
+                                      <p:to>
+                                        <p:strVal val="visible"/>
+                                      </p:to>
+                                    </p:set>
+                                    <p:animEffect transition="in" filter="fade">
+                                      <p:cBhvr>
+                                        <p:cTn id="47" dur="500"/>
+                                        <p:tgtEl>
+                                          <p:spTgt spid="11"/>
+                                        </p:tgtEl>
+                                      </p:cBhvr>
+                                    </p:animEffect>
+                                  </p:childTnLst>
+                                </p:cTn>
+                              </p:par>
+                              <p:par>
+                                <p:cTn id="48" presetID="10" presetClass="entr" presetSubtype="0" fill="hold" grpId="0" nodeType="withEffect">
+                                  <p:stCondLst>
+                                    <p:cond delay="0"/>
+                                  </p:stCondLst>
+                                  <p:childTnLst>
+                                    <p:set>
+                                      <p:cBhvr>
+                                        <p:cTn id="49" dur="1" fill="hold">
+                                          <p:stCondLst>
+                                            <p:cond delay="0"/>
+                                          </p:stCondLst>
+                                        </p:cTn>
+                                        <p:tgtEl>
+                                          <p:spTgt spid="12"/>
+                                        </p:tgtEl>
+                                        <p:attrNameLst>
+                                          <p:attrName>style.visibility</p:attrName>
+                                        </p:attrNameLst>
+                                      </p:cBhvr>
+                                      <p:to>
+                                        <p:strVal val="visible"/>
+                                      </p:to>
+                                    </p:set>
+                                    <p:animEffect transition="in" filter="fade">
+                                      <p:cBhvr>
+                                        <p:cTn id="50" dur="500"/>
+                                        <p:tgtEl>
+                                          <p:spTgt spid="12"/>
+                                        </p:tgtEl>
+                                      </p:cBhvr>
+                                    </p:animEffect>
+                                  </p:childTnLst>
+                                </p:cTn>
+                              </p:par>
+                              <p:par>
+                                <p:cTn id="51" presetID="10" presetClass="entr" presetSubtype="0" fill="hold" grpId="0" nodeType="withEffect">
+                                  <p:stCondLst>
+                                    <p:cond delay="0"/>
+                                  </p:stCondLst>
+                                  <p:childTnLst>
+                                    <p:set>
+                                      <p:cBhvr>
+                                        <p:cTn id="52" dur="1" fill="hold">
+                                          <p:stCondLst>
+                                            <p:cond delay="0"/>
+                                          </p:stCondLst>
+                                        </p:cTn>
+                                        <p:tgtEl>
+                                          <p:spTgt spid="13"/>
+                                        </p:tgtEl>
+                                        <p:attrNameLst>
+                                          <p:attrName>style.visibility</p:attrName>
+                                        </p:attrNameLst>
+                                      </p:cBhvr>
+                                      <p:to>
+                                        <p:strVal val="visible"/>
+                                      </p:to>
+                                    </p:set>
+                                    <p:animEffect transition="in" filter="fade">
+                                      <p:cBhvr>
+                                        <p:cTn id="53" dur="500"/>
+                                        <p:tgtEl>
+                                          <p:spTgt spid="13"/>
+                                        </p:tgtEl>
+                                      </p:cBhvr>
+                                    </p:animEffect>
+                                  </p:childTnLst>
+                                </p:cTn>
+                              </p:par>
+                              <p:par>
+                                <p:cTn id="54" presetID="10" presetClass="entr" presetSubtype="0" fill="hold" nodeType="withEffect">
+                                  <p:stCondLst>
+                                    <p:cond delay="0"/>
+                                  </p:stCondLst>
+                                  <p:childTnLst>
+                                    <p:set>
+                                      <p:cBhvr>
+                                        <p:cTn id="55" dur="1" fill="hold">
+                                          <p:stCondLst>
+                                            <p:cond delay="0"/>
+                                          </p:stCondLst>
+                                        </p:cTn>
+                                        <p:tgtEl>
+                                          <p:spTgt spid="29"/>
+                                        </p:tgtEl>
+                                        <p:attrNameLst>
+                                          <p:attrName>style.visibility</p:attrName>
+                                        </p:attrNameLst>
+                                      </p:cBhvr>
+                                      <p:to>
+                                        <p:strVal val="visible"/>
+                                      </p:to>
+                                    </p:set>
+                                    <p:animEffect transition="in" filter="fade">
+                                      <p:cBhvr>
+                                        <p:cTn id="56" dur="500"/>
+                                        <p:tgtEl>
+                                          <p:spTgt spid="29"/>
+                                        </p:tgtEl>
+                                      </p:cBhvr>
+                                    </p:animEffect>
+                                  </p:childTnLst>
+                                </p:cTn>
+                              </p:par>
+                              <p:par>
+                                <p:cTn id="57" presetID="10" presetClass="entr" presetSubtype="0" fill="hold" nodeType="withEffect">
+                                  <p:stCondLst>
+                                    <p:cond delay="0"/>
+                                  </p:stCondLst>
+                                  <p:childTnLst>
+                                    <p:set>
+                                      <p:cBhvr>
+                                        <p:cTn id="58" dur="1" fill="hold">
+                                          <p:stCondLst>
+                                            <p:cond delay="0"/>
+                                          </p:stCondLst>
+                                        </p:cTn>
+                                        <p:tgtEl>
+                                          <p:spTgt spid="31"/>
+                                        </p:tgtEl>
+                                        <p:attrNameLst>
+                                          <p:attrName>style.visibility</p:attrName>
+                                        </p:attrNameLst>
+                                      </p:cBhvr>
+                                      <p:to>
+                                        <p:strVal val="visible"/>
+                                      </p:to>
+                                    </p:set>
+                                    <p:animEffect transition="in" filter="fade">
+                                      <p:cBhvr>
+                                        <p:cTn id="59" dur="500"/>
+                                        <p:tgtEl>
+                                          <p:spTgt spid="31"/>
+                                        </p:tgtEl>
+                                      </p:cBhvr>
+                                    </p:animEffect>
+                                  </p:childTnLst>
+                                </p:cTn>
+                              </p:par>
+                              <p:par>
+                                <p:cTn id="60" presetID="10" presetClass="entr" presetSubtype="0" fill="hold" nodeType="withEffect">
+                                  <p:stCondLst>
+                                    <p:cond delay="0"/>
+                                  </p:stCondLst>
+                                  <p:childTnLst>
+                                    <p:set>
+                                      <p:cBhvr>
+                                        <p:cTn id="61" dur="1" fill="hold">
+                                          <p:stCondLst>
+                                            <p:cond delay="0"/>
+                                          </p:stCondLst>
+                                        </p:cTn>
+                                        <p:tgtEl>
+                                          <p:spTgt spid="33"/>
+                                        </p:tgtEl>
+                                        <p:attrNameLst>
+                                          <p:attrName>style.visibility</p:attrName>
+                                        </p:attrNameLst>
+                                      </p:cBhvr>
+                                      <p:to>
+                                        <p:strVal val="visible"/>
+                                      </p:to>
+                                    </p:set>
+                                    <p:animEffect transition="in" filter="fade">
+                                      <p:cBhvr>
+                                        <p:cTn id="62" dur="500"/>
+                                        <p:tgtEl>
+                                          <p:spTgt spid="33"/>
+                                        </p:tgtEl>
+                                      </p:cBhvr>
+                                    </p:animEffect>
+                                  </p:childTnLst>
+                                </p:cTn>
+                              </p:par>
+                            </p:childTnLst>
+                          </p:cTn>
+                        </p:par>
+                      </p:childTnLst>
+                    </p:cTn>
+                  </p:par>
+                </p:childTnLst>
+              </p:cTn>
+              <p:prevCondLst>
+                <p:cond evt="onPrev" delay="0">
+                  <p:tgtEl>
+                    <p:sldTgt/>
+                  </p:tgtEl>
+                </p:cond>
+              </p:prevCondLst>
+              <p:nextCondLst>
+                <p:cond evt="onNext" delay="0">
+                  <p:tgtEl>
+                    <p:sldTgt/>
+                  </p:tgtEl>
+                </p:cond>
+              </p:nextCondLst>
+            </p:seq>
+          </p:childTnLst>
+        </p:cTn>
+      </p:par>
+    </p:tnLst>
+    <p:bldLst>
+      <p:bldP spid="4" grpId="0"/>
+      <p:bldP spid="6" grpId="0"/>
+      <p:bldP spid="7" grpId="0"/>
+      <p:bldP spid="8" grpId="0"/>
+      <p:bldP spid="9" grpId="0"/>
+      <p:bldP spid="10" grpId="0"/>
+      <p:bldP spid="11" grpId="0"/>
+      <p:bldP spid="12" grpId="0"/>
+      <p:bldP spid="13" grpId="0"/>
+    </p:bldLst>
+  </p:timing>
 </p:sld>
 </file>
 
@@ -7518,6 +9457,35 @@
           </a:prstGeom>
         </p:spPr>
       </p:pic>
+      <p:sp>
+        <p:nvSpPr>
+          <p:cNvPr id="3" name="Foliennummernplatzhalter 2">
+            <a:extLst>
+              <a:ext uri="{FF2B5EF4-FFF2-40B4-BE49-F238E27FC236}">
+                <a16:creationId xmlns:a16="http://schemas.microsoft.com/office/drawing/2014/main" id="{3AD01783-13B5-B155-86C0-A08DEC0F883B}"/>
+              </a:ext>
+            </a:extLst>
+          </p:cNvPr>
+          <p:cNvSpPr>
+            <a:spLocks noGrp="1"/>
+          </p:cNvSpPr>
+          <p:nvPr>
+            <p:ph type="sldNum" sz="quarter" idx="12"/>
+          </p:nvPr>
+        </p:nvSpPr>
+        <p:spPr/>
+        <p:txBody>
+          <a:bodyPr/>
+          <a:lstStyle/>
+          <a:p>
+            <a:fld id="{1A401315-7350-4ECF-B456-363AC987C71C}" type="slidenum">
+              <a:rPr lang="en-GB" smtClean="0"/>
+              <a:t>17</a:t>
+            </a:fld>
+            <a:endParaRPr lang="en-GB"/>
+          </a:p>
+        </p:txBody>
+      </p:sp>
     </p:spTree>
     <p:extLst>
       <p:ext uri="{BB962C8B-B14F-4D97-AF65-F5344CB8AC3E}">
@@ -7528,6 +9496,9 @@
   <p:clrMapOvr>
     <a:masterClrMapping/>
   </p:clrMapOvr>
+  <p:transition spd="slow">
+    <p:push/>
+  </p:transition>
 </p:sld>
 </file>
 
@@ -7778,6 +9749,35 @@
           </a:prstGeom>
         </p:spPr>
       </p:pic>
+      <p:sp>
+        <p:nvSpPr>
+          <p:cNvPr id="3" name="Foliennummernplatzhalter 2">
+            <a:extLst>
+              <a:ext uri="{FF2B5EF4-FFF2-40B4-BE49-F238E27FC236}">
+                <a16:creationId xmlns:a16="http://schemas.microsoft.com/office/drawing/2014/main" id="{D8EDA6F6-6D77-D342-95F9-341A5CD66105}"/>
+              </a:ext>
+            </a:extLst>
+          </p:cNvPr>
+          <p:cNvSpPr>
+            <a:spLocks noGrp="1"/>
+          </p:cNvSpPr>
+          <p:nvPr>
+            <p:ph type="sldNum" sz="quarter" idx="12"/>
+          </p:nvPr>
+        </p:nvSpPr>
+        <p:spPr/>
+        <p:txBody>
+          <a:bodyPr/>
+          <a:lstStyle/>
+          <a:p>
+            <a:fld id="{1A401315-7350-4ECF-B456-363AC987C71C}" type="slidenum">
+              <a:rPr lang="en-GB" smtClean="0"/>
+              <a:t>18</a:t>
+            </a:fld>
+            <a:endParaRPr lang="en-GB"/>
+          </a:p>
+        </p:txBody>
+      </p:sp>
     </p:spTree>
     <p:extLst>
       <p:ext uri="{BB962C8B-B14F-4D97-AF65-F5344CB8AC3E}">
@@ -7788,6 +9788,9 @@
   <p:clrMapOvr>
     <a:masterClrMapping/>
   </p:clrMapOvr>
+  <p:transition spd="slow">
+    <p:push/>
+  </p:transition>
 </p:sld>
 </file>
 
@@ -8247,6 +10250,35 @@
           </a:extLst>
         </p:spPr>
       </p:pic>
+      <p:sp>
+        <p:nvSpPr>
+          <p:cNvPr id="3" name="Foliennummernplatzhalter 2">
+            <a:extLst>
+              <a:ext uri="{FF2B5EF4-FFF2-40B4-BE49-F238E27FC236}">
+                <a16:creationId xmlns:a16="http://schemas.microsoft.com/office/drawing/2014/main" id="{C68DC895-61A9-4703-E844-85BD84062B83}"/>
+              </a:ext>
+            </a:extLst>
+          </p:cNvPr>
+          <p:cNvSpPr>
+            <a:spLocks noGrp="1"/>
+          </p:cNvSpPr>
+          <p:nvPr>
+            <p:ph type="sldNum" sz="quarter" idx="12"/>
+          </p:nvPr>
+        </p:nvSpPr>
+        <p:spPr/>
+        <p:txBody>
+          <a:bodyPr/>
+          <a:lstStyle/>
+          <a:p>
+            <a:fld id="{1A401315-7350-4ECF-B456-363AC987C71C}" type="slidenum">
+              <a:rPr lang="en-GB" smtClean="0"/>
+              <a:t>19</a:t>
+            </a:fld>
+            <a:endParaRPr lang="en-GB"/>
+          </a:p>
+        </p:txBody>
+      </p:sp>
     </p:spTree>
     <p:extLst>
       <p:ext uri="{BB962C8B-B14F-4D97-AF65-F5344CB8AC3E}">
@@ -8257,6 +10289,18 @@
   <p:clrMapOvr>
     <a:masterClrMapping/>
   </p:clrMapOvr>
+  <mc:AlternateContent xmlns:mc="http://schemas.openxmlformats.org/markup-compatibility/2006">
+    <mc:Choice xmlns:p15="http://schemas.microsoft.com/office/powerpoint/2012/main" Requires="p15">
+      <p:transition xmlns:p14="http://schemas.microsoft.com/office/powerpoint/2010/main" spd="slow" p14:dur="6000">
+        <p15:prstTrans prst="curtains"/>
+      </p:transition>
+    </mc:Choice>
+    <mc:Fallback>
+      <p:transition spd="slow">
+        <p:fade/>
+      </p:transition>
+    </mc:Fallback>
+  </mc:AlternateContent>
   <p:timing>
     <p:tnLst>
       <p:par>
@@ -8523,10 +10567,314 @@
           </a:prstGeom>
         </p:spPr>
       </p:pic>
+      <p:sp>
+        <p:nvSpPr>
+          <p:cNvPr id="3" name="Foliennummernplatzhalter 2">
+            <a:extLst>
+              <a:ext uri="{FF2B5EF4-FFF2-40B4-BE49-F238E27FC236}">
+                <a16:creationId xmlns:a16="http://schemas.microsoft.com/office/drawing/2014/main" id="{F28C2B74-4F9F-2C59-09FA-AE6C5608615B}"/>
+              </a:ext>
+            </a:extLst>
+          </p:cNvPr>
+          <p:cNvSpPr>
+            <a:spLocks noGrp="1"/>
+          </p:cNvSpPr>
+          <p:nvPr>
+            <p:ph type="sldNum" sz="quarter" idx="12"/>
+          </p:nvPr>
+        </p:nvSpPr>
+        <p:spPr/>
+        <p:txBody>
+          <a:bodyPr/>
+          <a:lstStyle/>
+          <a:p>
+            <a:fld id="{1A401315-7350-4ECF-B456-363AC987C71C}" type="slidenum">
+              <a:rPr lang="en-GB" smtClean="0"/>
+              <a:t>2</a:t>
+            </a:fld>
+            <a:endParaRPr lang="en-GB" dirty="0"/>
+          </a:p>
+        </p:txBody>
+      </p:sp>
     </p:spTree>
     <p:extLst>
       <p:ext uri="{BB962C8B-B14F-4D97-AF65-F5344CB8AC3E}">
         <p14:creationId xmlns:p14="http://schemas.microsoft.com/office/powerpoint/2010/main" val="1006519718"/>
+      </p:ext>
+    </p:extLst>
+  </p:cSld>
+  <p:clrMapOvr>
+    <a:masterClrMapping/>
+  </p:clrMapOvr>
+  <p:transition spd="slow">
+    <p:push dir="u"/>
+  </p:transition>
+</p:sld>
+</file>
+
+<file path=ppt/slides/slide20.xml><?xml version="1.0" encoding="utf-8"?>
+<p:sld xmlns:a="http://schemas.openxmlformats.org/drawingml/2006/main" xmlns:r="http://schemas.openxmlformats.org/officeDocument/2006/relationships" xmlns:p="http://schemas.openxmlformats.org/presentationml/2006/main">
+  <p:cSld>
+    <p:spTree>
+      <p:nvGrpSpPr>
+        <p:cNvPr id="1" name=""/>
+        <p:cNvGrpSpPr/>
+        <p:nvPr/>
+      </p:nvGrpSpPr>
+      <p:grpSpPr>
+        <a:xfrm>
+          <a:off x="0" y="0"/>
+          <a:ext cx="0" cy="0"/>
+          <a:chOff x="0" y="0"/>
+          <a:chExt cx="0" cy="0"/>
+        </a:xfrm>
+      </p:grpSpPr>
+      <p:sp>
+        <p:nvSpPr>
+          <p:cNvPr id="2" name="Titel 1">
+            <a:extLst>
+              <a:ext uri="{FF2B5EF4-FFF2-40B4-BE49-F238E27FC236}">
+                <a16:creationId xmlns:a16="http://schemas.microsoft.com/office/drawing/2014/main" id="{AC8AECF0-4FDD-3190-E4A9-15E12EF5E3B2}"/>
+              </a:ext>
+            </a:extLst>
+          </p:cNvPr>
+          <p:cNvSpPr>
+            <a:spLocks noGrp="1"/>
+          </p:cNvSpPr>
+          <p:nvPr>
+            <p:ph type="title"/>
+          </p:nvPr>
+        </p:nvSpPr>
+        <p:spPr/>
+        <p:txBody>
+          <a:bodyPr/>
+          <a:lstStyle/>
+          <a:p>
+            <a:r>
+              <a:rPr lang="de-DE" dirty="0"/>
+              <a:t>Quellen</a:t>
+            </a:r>
+            <a:endParaRPr lang="de-AT" dirty="0"/>
+          </a:p>
+        </p:txBody>
+      </p:sp>
+      <p:sp>
+        <p:nvSpPr>
+          <p:cNvPr id="3" name="Inhaltsplatzhalter 2">
+            <a:extLst>
+              <a:ext uri="{FF2B5EF4-FFF2-40B4-BE49-F238E27FC236}">
+                <a16:creationId xmlns:a16="http://schemas.microsoft.com/office/drawing/2014/main" id="{71E4871D-D773-A862-D083-5391CDF6C232}"/>
+              </a:ext>
+            </a:extLst>
+          </p:cNvPr>
+          <p:cNvSpPr>
+            <a:spLocks noGrp="1"/>
+          </p:cNvSpPr>
+          <p:nvPr>
+            <p:ph idx="1"/>
+          </p:nvPr>
+        </p:nvSpPr>
+        <p:spPr/>
+        <p:txBody>
+          <a:bodyPr>
+            <a:normAutofit/>
+          </a:bodyPr>
+          <a:lstStyle/>
+          <a:p>
+            <a:pPr>
+              <a:lnSpc>
+                <a:spcPct val="115000"/>
+              </a:lnSpc>
+              <a:spcAft>
+                <a:spcPts val="800"/>
+              </a:spcAft>
+            </a:pPr>
+            <a:r>
+              <a:rPr lang="de-DE" sz="2000" u="sng" kern="100" dirty="0">
+                <a:solidFill>
+                  <a:srgbClr val="467886"/>
+                </a:solidFill>
+                <a:effectLst/>
+                <a:latin typeface="Aptos" panose="020B0004020202020204" pitchFamily="34" charset="0"/>
+                <a:ea typeface="Aptos" panose="020B0004020202020204" pitchFamily="34" charset="0"/>
+                <a:cs typeface="Times New Roman" panose="02020603050405020304" pitchFamily="18" charset="0"/>
+                <a:hlinkClick r:id="rId2"/>
+              </a:rPr>
+              <a:t>https://media.daa-pm.de/ufv_wirtschaftslexikon/Html/P/PDF/Projektidee-Projektauftrag.pdf</a:t>
+            </a:r>
+            <a:endParaRPr lang="de-AT" sz="2000" kern="100" dirty="0">
+              <a:effectLst/>
+              <a:latin typeface="Aptos" panose="020B0004020202020204" pitchFamily="34" charset="0"/>
+              <a:ea typeface="Aptos" panose="020B0004020202020204" pitchFamily="34" charset="0"/>
+              <a:cs typeface="Times New Roman" panose="02020603050405020304" pitchFamily="18" charset="0"/>
+            </a:endParaRPr>
+          </a:p>
+          <a:p>
+            <a:pPr>
+              <a:lnSpc>
+                <a:spcPct val="115000"/>
+              </a:lnSpc>
+              <a:spcAft>
+                <a:spcPts val="800"/>
+              </a:spcAft>
+            </a:pPr>
+            <a:r>
+              <a:rPr lang="de-DE" sz="2000" u="sng" kern="100" dirty="0">
+                <a:solidFill>
+                  <a:srgbClr val="467886"/>
+                </a:solidFill>
+                <a:effectLst/>
+                <a:latin typeface="Aptos" panose="020B0004020202020204" pitchFamily="34" charset="0"/>
+                <a:ea typeface="Aptos" panose="020B0004020202020204" pitchFamily="34" charset="0"/>
+                <a:cs typeface="Times New Roman" panose="02020603050405020304" pitchFamily="18" charset="0"/>
+                <a:hlinkClick r:id="rId3"/>
+              </a:rPr>
+              <a:t>https://projekte-leicht-gemacht.de/blog/methoden/projektstart/der-projektsteckbrief-und-welcher-wichtige-punkt-oft-vergessen-wird/</a:t>
+            </a:r>
+            <a:endParaRPr lang="de-AT" sz="2000" kern="100" dirty="0">
+              <a:effectLst/>
+              <a:latin typeface="Aptos" panose="020B0004020202020204" pitchFamily="34" charset="0"/>
+              <a:ea typeface="Aptos" panose="020B0004020202020204" pitchFamily="34" charset="0"/>
+              <a:cs typeface="Times New Roman" panose="02020603050405020304" pitchFamily="18" charset="0"/>
+            </a:endParaRPr>
+          </a:p>
+          <a:p>
+            <a:pPr>
+              <a:lnSpc>
+                <a:spcPct val="115000"/>
+              </a:lnSpc>
+              <a:spcAft>
+                <a:spcPts val="800"/>
+              </a:spcAft>
+            </a:pPr>
+            <a:r>
+              <a:rPr lang="de-DE" sz="2000" u="sng" kern="100" dirty="0">
+                <a:solidFill>
+                  <a:srgbClr val="467886"/>
+                </a:solidFill>
+                <a:effectLst/>
+                <a:latin typeface="Aptos" panose="020B0004020202020204" pitchFamily="34" charset="0"/>
+                <a:ea typeface="Aptos" panose="020B0004020202020204" pitchFamily="34" charset="0"/>
+                <a:cs typeface="Times New Roman" panose="02020603050405020304" pitchFamily="18" charset="0"/>
+                <a:hlinkClick r:id="rId4"/>
+              </a:rPr>
+              <a:t>https://asana.com/de/resources/feasibility-study</a:t>
+            </a:r>
+            <a:endParaRPr lang="de-AT" sz="2000" kern="100" dirty="0">
+              <a:effectLst/>
+              <a:latin typeface="Aptos" panose="020B0004020202020204" pitchFamily="34" charset="0"/>
+              <a:ea typeface="Aptos" panose="020B0004020202020204" pitchFamily="34" charset="0"/>
+              <a:cs typeface="Times New Roman" panose="02020603050405020304" pitchFamily="18" charset="0"/>
+            </a:endParaRPr>
+          </a:p>
+          <a:p>
+            <a:pPr>
+              <a:lnSpc>
+                <a:spcPct val="115000"/>
+              </a:lnSpc>
+              <a:spcAft>
+                <a:spcPts val="800"/>
+              </a:spcAft>
+            </a:pPr>
+            <a:r>
+              <a:rPr lang="de-DE" sz="2000" u="sng" kern="100" dirty="0">
+                <a:solidFill>
+                  <a:srgbClr val="467886"/>
+                </a:solidFill>
+                <a:effectLst/>
+                <a:latin typeface="Aptos" panose="020B0004020202020204" pitchFamily="34" charset="0"/>
+                <a:ea typeface="Aptos" panose="020B0004020202020204" pitchFamily="34" charset="0"/>
+                <a:cs typeface="Times New Roman" panose="02020603050405020304" pitchFamily="18" charset="0"/>
+                <a:hlinkClick r:id="rId5"/>
+              </a:rPr>
+              <a:t>https://blog.mindmanager.com/de/die-strategische-rolle-des-projektauftrags-verstehen/</a:t>
+            </a:r>
+            <a:endParaRPr lang="de-AT" sz="2000" kern="100" dirty="0">
+              <a:effectLst/>
+              <a:latin typeface="Aptos" panose="020B0004020202020204" pitchFamily="34" charset="0"/>
+              <a:ea typeface="Aptos" panose="020B0004020202020204" pitchFamily="34" charset="0"/>
+              <a:cs typeface="Times New Roman" panose="02020603050405020304" pitchFamily="18" charset="0"/>
+            </a:endParaRPr>
+          </a:p>
+          <a:p>
+            <a:pPr>
+              <a:lnSpc>
+                <a:spcPct val="115000"/>
+              </a:lnSpc>
+              <a:spcAft>
+                <a:spcPts val="800"/>
+              </a:spcAft>
+            </a:pPr>
+            <a:r>
+              <a:rPr lang="de-AT" sz="2000" kern="100" dirty="0">
+                <a:effectLst/>
+                <a:latin typeface="Aptos" panose="020B0004020202020204" pitchFamily="34" charset="0"/>
+                <a:ea typeface="Aptos" panose="020B0004020202020204" pitchFamily="34" charset="0"/>
+                <a:cs typeface="Times New Roman" panose="02020603050405020304" pitchFamily="18" charset="0"/>
+              </a:rPr>
+              <a:t>Systemplanung und Projektentwicklung HTL III</a:t>
+            </a:r>
+          </a:p>
+          <a:p>
+            <a:pPr>
+              <a:lnSpc>
+                <a:spcPct val="115000"/>
+              </a:lnSpc>
+              <a:spcAft>
+                <a:spcPts val="800"/>
+              </a:spcAft>
+            </a:pPr>
+            <a:r>
+              <a:rPr lang="de-DE" sz="2000" kern="100" dirty="0">
+                <a:effectLst/>
+                <a:latin typeface="Aptos" panose="020B0004020202020204" pitchFamily="34" charset="0"/>
+                <a:ea typeface="Aptos" panose="020B0004020202020204" pitchFamily="34" charset="0"/>
+                <a:cs typeface="Times New Roman" panose="02020603050405020304" pitchFamily="18" charset="0"/>
+              </a:rPr>
+              <a:t>DeepSeek: Zusammenfassung der Seiten 37-77 aus Systemplanung und Projektentwicklung HTL III</a:t>
+            </a:r>
+            <a:endParaRPr lang="de-AT" sz="2000" kern="100" dirty="0">
+              <a:effectLst/>
+              <a:latin typeface="Aptos" panose="020B0004020202020204" pitchFamily="34" charset="0"/>
+              <a:ea typeface="Aptos" panose="020B0004020202020204" pitchFamily="34" charset="0"/>
+              <a:cs typeface="Times New Roman" panose="02020603050405020304" pitchFamily="18" charset="0"/>
+            </a:endParaRPr>
+          </a:p>
+        </p:txBody>
+      </p:sp>
+      <p:sp>
+        <p:nvSpPr>
+          <p:cNvPr id="4" name="Foliennummernplatzhalter 3">
+            <a:extLst>
+              <a:ext uri="{FF2B5EF4-FFF2-40B4-BE49-F238E27FC236}">
+                <a16:creationId xmlns:a16="http://schemas.microsoft.com/office/drawing/2014/main" id="{B6789AE2-4A6E-A1D9-6792-C63CCCEFB4AE}"/>
+              </a:ext>
+            </a:extLst>
+          </p:cNvPr>
+          <p:cNvSpPr>
+            <a:spLocks noGrp="1"/>
+          </p:cNvSpPr>
+          <p:nvPr>
+            <p:ph type="sldNum" sz="quarter" idx="12"/>
+          </p:nvPr>
+        </p:nvSpPr>
+        <p:spPr/>
+        <p:txBody>
+          <a:bodyPr/>
+          <a:lstStyle/>
+          <a:p>
+            <a:fld id="{1A401315-7350-4ECF-B456-363AC987C71C}" type="slidenum">
+              <a:rPr lang="en-GB" smtClean="0"/>
+              <a:t>20</a:t>
+            </a:fld>
+            <a:endParaRPr lang="en-GB"/>
+          </a:p>
+        </p:txBody>
+      </p:sp>
+    </p:spTree>
+    <p:extLst>
+      <p:ext uri="{BB962C8B-B14F-4D97-AF65-F5344CB8AC3E}">
+        <p14:creationId xmlns:p14="http://schemas.microsoft.com/office/powerpoint/2010/main" val="198922460"/>
       </p:ext>
     </p:extLst>
   </p:cSld>
@@ -8623,6 +10971,35 @@
           </a:prstGeom>
         </p:spPr>
       </p:pic>
+      <p:sp>
+        <p:nvSpPr>
+          <p:cNvPr id="3" name="Foliennummernplatzhalter 2">
+            <a:extLst>
+              <a:ext uri="{FF2B5EF4-FFF2-40B4-BE49-F238E27FC236}">
+                <a16:creationId xmlns:a16="http://schemas.microsoft.com/office/drawing/2014/main" id="{E760F03F-C6CE-0B65-BDBC-7CEE2D9617F8}"/>
+              </a:ext>
+            </a:extLst>
+          </p:cNvPr>
+          <p:cNvSpPr>
+            <a:spLocks noGrp="1"/>
+          </p:cNvSpPr>
+          <p:nvPr>
+            <p:ph type="sldNum" sz="quarter" idx="12"/>
+          </p:nvPr>
+        </p:nvSpPr>
+        <p:spPr/>
+        <p:txBody>
+          <a:bodyPr/>
+          <a:lstStyle/>
+          <a:p>
+            <a:fld id="{1A401315-7350-4ECF-B456-363AC987C71C}" type="slidenum">
+              <a:rPr lang="en-GB" smtClean="0"/>
+              <a:t>3</a:t>
+            </a:fld>
+            <a:endParaRPr lang="en-GB"/>
+          </a:p>
+        </p:txBody>
+      </p:sp>
     </p:spTree>
     <p:extLst>
       <p:ext uri="{BB962C8B-B14F-4D97-AF65-F5344CB8AC3E}">
@@ -8633,6 +11010,9 @@
   <p:clrMapOvr>
     <a:masterClrMapping/>
   </p:clrMapOvr>
+  <p:transition spd="slow">
+    <p:push/>
+  </p:transition>
 </p:sld>
 </file>
 
@@ -8921,6 +11301,35 @@
           </a:p>
         </p:txBody>
       </p:sp>
+      <p:sp>
+        <p:nvSpPr>
+          <p:cNvPr id="3" name="Foliennummernplatzhalter 2">
+            <a:extLst>
+              <a:ext uri="{FF2B5EF4-FFF2-40B4-BE49-F238E27FC236}">
+                <a16:creationId xmlns:a16="http://schemas.microsoft.com/office/drawing/2014/main" id="{8F8D4A22-414A-B752-466F-4D5AF37BF79D}"/>
+              </a:ext>
+            </a:extLst>
+          </p:cNvPr>
+          <p:cNvSpPr>
+            <a:spLocks noGrp="1"/>
+          </p:cNvSpPr>
+          <p:nvPr>
+            <p:ph type="sldNum" sz="quarter" idx="12"/>
+          </p:nvPr>
+        </p:nvSpPr>
+        <p:spPr/>
+        <p:txBody>
+          <a:bodyPr/>
+          <a:lstStyle/>
+          <a:p>
+            <a:fld id="{1A401315-7350-4ECF-B456-363AC987C71C}" type="slidenum">
+              <a:rPr lang="en-GB" smtClean="0"/>
+              <a:t>4</a:t>
+            </a:fld>
+            <a:endParaRPr lang="en-GB"/>
+          </a:p>
+        </p:txBody>
+      </p:sp>
     </p:spTree>
     <p:extLst>
       <p:ext uri="{BB962C8B-B14F-4D97-AF65-F5344CB8AC3E}">
@@ -8931,6 +11340,167 @@
   <p:clrMapOvr>
     <a:masterClrMapping/>
   </p:clrMapOvr>
+  <p:transition spd="slow">
+    <p:push dir="d"/>
+  </p:transition>
+  <p:timing>
+    <p:tnLst>
+      <p:par>
+        <p:cTn id="1" dur="indefinite" restart="never" nodeType="tmRoot">
+          <p:childTnLst>
+            <p:seq concurrent="1" nextAc="seek">
+              <p:cTn id="2" dur="indefinite" nodeType="mainSeq">
+                <p:childTnLst>
+                  <p:par>
+                    <p:cTn id="3" fill="hold">
+                      <p:stCondLst>
+                        <p:cond delay="indefinite"/>
+                      </p:stCondLst>
+                      <p:childTnLst>
+                        <p:par>
+                          <p:cTn id="4" fill="hold">
+                            <p:stCondLst>
+                              <p:cond delay="0"/>
+                            </p:stCondLst>
+                            <p:childTnLst>
+                              <p:par>
+                                <p:cTn id="5" presetID="10" presetClass="entr" presetSubtype="0" fill="hold" grpId="0" nodeType="clickEffect">
+                                  <p:stCondLst>
+                                    <p:cond delay="0"/>
+                                  </p:stCondLst>
+                                  <p:childTnLst>
+                                    <p:set>
+                                      <p:cBhvr>
+                                        <p:cTn id="6" dur="1" fill="hold">
+                                          <p:stCondLst>
+                                            <p:cond delay="0"/>
+                                          </p:stCondLst>
+                                        </p:cTn>
+                                        <p:tgtEl>
+                                          <p:spTgt spid="8"/>
+                                        </p:tgtEl>
+                                        <p:attrNameLst>
+                                          <p:attrName>style.visibility</p:attrName>
+                                        </p:attrNameLst>
+                                      </p:cBhvr>
+                                      <p:to>
+                                        <p:strVal val="visible"/>
+                                      </p:to>
+                                    </p:set>
+                                    <p:animEffect transition="in" filter="fade">
+                                      <p:cBhvr>
+                                        <p:cTn id="7" dur="500"/>
+                                        <p:tgtEl>
+                                          <p:spTgt spid="8"/>
+                                        </p:tgtEl>
+                                      </p:cBhvr>
+                                    </p:animEffect>
+                                  </p:childTnLst>
+                                </p:cTn>
+                              </p:par>
+                              <p:par>
+                                <p:cTn id="8" presetID="10" presetClass="entr" presetSubtype="0" fill="hold" grpId="0" nodeType="withEffect">
+                                  <p:stCondLst>
+                                    <p:cond delay="0"/>
+                                  </p:stCondLst>
+                                  <p:childTnLst>
+                                    <p:set>
+                                      <p:cBhvr>
+                                        <p:cTn id="9" dur="1" fill="hold">
+                                          <p:stCondLst>
+                                            <p:cond delay="0"/>
+                                          </p:stCondLst>
+                                        </p:cTn>
+                                        <p:tgtEl>
+                                          <p:spTgt spid="12"/>
+                                        </p:tgtEl>
+                                        <p:attrNameLst>
+                                          <p:attrName>style.visibility</p:attrName>
+                                        </p:attrNameLst>
+                                      </p:cBhvr>
+                                      <p:to>
+                                        <p:strVal val="visible"/>
+                                      </p:to>
+                                    </p:set>
+                                    <p:animEffect transition="in" filter="fade">
+                                      <p:cBhvr>
+                                        <p:cTn id="10" dur="500"/>
+                                        <p:tgtEl>
+                                          <p:spTgt spid="12"/>
+                                        </p:tgtEl>
+                                      </p:cBhvr>
+                                    </p:animEffect>
+                                  </p:childTnLst>
+                                </p:cTn>
+                              </p:par>
+                              <p:par>
+                                <p:cTn id="11" presetID="10" presetClass="entr" presetSubtype="0" fill="hold" grpId="0" nodeType="withEffect">
+                                  <p:stCondLst>
+                                    <p:cond delay="0"/>
+                                  </p:stCondLst>
+                                  <p:childTnLst>
+                                    <p:set>
+                                      <p:cBhvr>
+                                        <p:cTn id="12" dur="1" fill="hold">
+                                          <p:stCondLst>
+                                            <p:cond delay="0"/>
+                                          </p:stCondLst>
+                                        </p:cTn>
+                                        <p:tgtEl>
+                                          <p:spTgt spid="13"/>
+                                        </p:tgtEl>
+                                        <p:attrNameLst>
+                                          <p:attrName>style.visibility</p:attrName>
+                                        </p:attrNameLst>
+                                      </p:cBhvr>
+                                      <p:to>
+                                        <p:strVal val="visible"/>
+                                      </p:to>
+                                    </p:set>
+                                    <p:animEffect transition="in" filter="fade">
+                                      <p:cBhvr>
+                                        <p:cTn id="13" dur="500"/>
+                                        <p:tgtEl>
+                                          <p:spTgt spid="13"/>
+                                        </p:tgtEl>
+                                      </p:cBhvr>
+                                    </p:animEffect>
+                                  </p:childTnLst>
+                                </p:cTn>
+                              </p:par>
+                            </p:childTnLst>
+                          </p:cTn>
+                        </p:par>
+                      </p:childTnLst>
+                    </p:cTn>
+                  </p:par>
+                </p:childTnLst>
+              </p:cTn>
+              <p:prevCondLst>
+                <p:cond evt="onPrev" delay="0">
+                  <p:tgtEl>
+                    <p:sldTgt/>
+                  </p:tgtEl>
+                </p:cond>
+              </p:prevCondLst>
+              <p:nextCondLst>
+                <p:cond evt="onNext" delay="0">
+                  <p:tgtEl>
+                    <p:sldTgt/>
+                  </p:tgtEl>
+                </p:cond>
+              </p:nextCondLst>
+            </p:seq>
+          </p:childTnLst>
+        </p:cTn>
+      </p:par>
+    </p:tnLst>
+    <p:bldLst>
+      <p:bldP spid="8" grpId="0"/>
+      <p:bldP spid="12" grpId="0" animBg="1"/>
+      <p:bldP spid="13" grpId="0" animBg="1"/>
+    </p:bldLst>
+  </p:timing>
 </p:sld>
 </file>
 
@@ -9273,6 +11843,35 @@
           </a:prstGeom>
         </p:spPr>
       </p:pic>
+      <p:sp>
+        <p:nvSpPr>
+          <p:cNvPr id="3" name="Foliennummernplatzhalter 2">
+            <a:extLst>
+              <a:ext uri="{FF2B5EF4-FFF2-40B4-BE49-F238E27FC236}">
+                <a16:creationId xmlns:a16="http://schemas.microsoft.com/office/drawing/2014/main" id="{B00E68F8-56D4-FD72-995B-CB71FAE00FD1}"/>
+              </a:ext>
+            </a:extLst>
+          </p:cNvPr>
+          <p:cNvSpPr>
+            <a:spLocks noGrp="1"/>
+          </p:cNvSpPr>
+          <p:nvPr>
+            <p:ph type="sldNum" sz="quarter" idx="12"/>
+          </p:nvPr>
+        </p:nvSpPr>
+        <p:spPr/>
+        <p:txBody>
+          <a:bodyPr/>
+          <a:lstStyle/>
+          <a:p>
+            <a:fld id="{1A401315-7350-4ECF-B456-363AC987C71C}" type="slidenum">
+              <a:rPr lang="en-GB" smtClean="0"/>
+              <a:t>5</a:t>
+            </a:fld>
+            <a:endParaRPr lang="en-GB"/>
+          </a:p>
+        </p:txBody>
+      </p:sp>
     </p:spTree>
     <p:extLst>
       <p:ext uri="{BB962C8B-B14F-4D97-AF65-F5344CB8AC3E}">
@@ -9283,6 +11882,349 @@
   <p:clrMapOvr>
     <a:masterClrMapping/>
   </p:clrMapOvr>
+  <p:transition spd="slow">
+    <p:push/>
+  </p:transition>
+  <p:timing>
+    <p:tnLst>
+      <p:par>
+        <p:cTn id="1" dur="indefinite" restart="never" nodeType="tmRoot">
+          <p:childTnLst>
+            <p:seq concurrent="1" nextAc="seek">
+              <p:cTn id="2" dur="indefinite" nodeType="mainSeq">
+                <p:childTnLst>
+                  <p:par>
+                    <p:cTn id="3" fill="hold">
+                      <p:stCondLst>
+                        <p:cond delay="indefinite"/>
+                      </p:stCondLst>
+                      <p:childTnLst>
+                        <p:par>
+                          <p:cTn id="4" fill="hold">
+                            <p:stCondLst>
+                              <p:cond delay="0"/>
+                            </p:stCondLst>
+                            <p:childTnLst>
+                              <p:par>
+                                <p:cTn id="5" presetID="10" presetClass="entr" presetSubtype="0" fill="hold" grpId="0" nodeType="clickEffect">
+                                  <p:stCondLst>
+                                    <p:cond delay="0"/>
+                                  </p:stCondLst>
+                                  <p:childTnLst>
+                                    <p:set>
+                                      <p:cBhvr>
+                                        <p:cTn id="6" dur="1" fill="hold">
+                                          <p:stCondLst>
+                                            <p:cond delay="0"/>
+                                          </p:stCondLst>
+                                        </p:cTn>
+                                        <p:tgtEl>
+                                          <p:spTgt spid="4"/>
+                                        </p:tgtEl>
+                                        <p:attrNameLst>
+                                          <p:attrName>style.visibility</p:attrName>
+                                        </p:attrNameLst>
+                                      </p:cBhvr>
+                                      <p:to>
+                                        <p:strVal val="visible"/>
+                                      </p:to>
+                                    </p:set>
+                                    <p:animEffect transition="in" filter="fade">
+                                      <p:cBhvr>
+                                        <p:cTn id="7" dur="500"/>
+                                        <p:tgtEl>
+                                          <p:spTgt spid="4"/>
+                                        </p:tgtEl>
+                                      </p:cBhvr>
+                                    </p:animEffect>
+                                  </p:childTnLst>
+                                </p:cTn>
+                              </p:par>
+                              <p:par>
+                                <p:cTn id="8" presetID="10" presetClass="entr" presetSubtype="0" fill="hold" nodeType="withEffect">
+                                  <p:stCondLst>
+                                    <p:cond delay="0"/>
+                                  </p:stCondLst>
+                                  <p:childTnLst>
+                                    <p:set>
+                                      <p:cBhvr>
+                                        <p:cTn id="9" dur="1" fill="hold">
+                                          <p:stCondLst>
+                                            <p:cond delay="0"/>
+                                          </p:stCondLst>
+                                        </p:cTn>
+                                        <p:tgtEl>
+                                          <p:spTgt spid="1028"/>
+                                        </p:tgtEl>
+                                        <p:attrNameLst>
+                                          <p:attrName>style.visibility</p:attrName>
+                                        </p:attrNameLst>
+                                      </p:cBhvr>
+                                      <p:to>
+                                        <p:strVal val="visible"/>
+                                      </p:to>
+                                    </p:set>
+                                    <p:animEffect transition="in" filter="fade">
+                                      <p:cBhvr>
+                                        <p:cTn id="10" dur="500"/>
+                                        <p:tgtEl>
+                                          <p:spTgt spid="1028"/>
+                                        </p:tgtEl>
+                                      </p:cBhvr>
+                                    </p:animEffect>
+                                  </p:childTnLst>
+                                </p:cTn>
+                              </p:par>
+                            </p:childTnLst>
+                          </p:cTn>
+                        </p:par>
+                      </p:childTnLst>
+                    </p:cTn>
+                  </p:par>
+                  <p:par>
+                    <p:cTn id="11" fill="hold">
+                      <p:stCondLst>
+                        <p:cond delay="indefinite"/>
+                      </p:stCondLst>
+                      <p:childTnLst>
+                        <p:par>
+                          <p:cTn id="12" fill="hold">
+                            <p:stCondLst>
+                              <p:cond delay="0"/>
+                            </p:stCondLst>
+                            <p:childTnLst>
+                              <p:par>
+                                <p:cTn id="13" presetID="10" presetClass="entr" presetSubtype="0" fill="hold" grpId="0" nodeType="clickEffect">
+                                  <p:stCondLst>
+                                    <p:cond delay="0"/>
+                                  </p:stCondLst>
+                                  <p:childTnLst>
+                                    <p:set>
+                                      <p:cBhvr>
+                                        <p:cTn id="14" dur="1" fill="hold">
+                                          <p:stCondLst>
+                                            <p:cond delay="0"/>
+                                          </p:stCondLst>
+                                        </p:cTn>
+                                        <p:tgtEl>
+                                          <p:spTgt spid="6"/>
+                                        </p:tgtEl>
+                                        <p:attrNameLst>
+                                          <p:attrName>style.visibility</p:attrName>
+                                        </p:attrNameLst>
+                                      </p:cBhvr>
+                                      <p:to>
+                                        <p:strVal val="visible"/>
+                                      </p:to>
+                                    </p:set>
+                                    <p:animEffect transition="in" filter="fade">
+                                      <p:cBhvr>
+                                        <p:cTn id="15" dur="500"/>
+                                        <p:tgtEl>
+                                          <p:spTgt spid="6"/>
+                                        </p:tgtEl>
+                                      </p:cBhvr>
+                                    </p:animEffect>
+                                  </p:childTnLst>
+                                </p:cTn>
+                              </p:par>
+                              <p:par>
+                                <p:cTn id="16" presetID="10" presetClass="entr" presetSubtype="0" fill="hold" nodeType="withEffect">
+                                  <p:stCondLst>
+                                    <p:cond delay="0"/>
+                                  </p:stCondLst>
+                                  <p:childTnLst>
+                                    <p:set>
+                                      <p:cBhvr>
+                                        <p:cTn id="17" dur="1" fill="hold">
+                                          <p:stCondLst>
+                                            <p:cond delay="0"/>
+                                          </p:stCondLst>
+                                        </p:cTn>
+                                        <p:tgtEl>
+                                          <p:spTgt spid="1030"/>
+                                        </p:tgtEl>
+                                        <p:attrNameLst>
+                                          <p:attrName>style.visibility</p:attrName>
+                                        </p:attrNameLst>
+                                      </p:cBhvr>
+                                      <p:to>
+                                        <p:strVal val="visible"/>
+                                      </p:to>
+                                    </p:set>
+                                    <p:animEffect transition="in" filter="fade">
+                                      <p:cBhvr>
+                                        <p:cTn id="18" dur="500"/>
+                                        <p:tgtEl>
+                                          <p:spTgt spid="1030"/>
+                                        </p:tgtEl>
+                                      </p:cBhvr>
+                                    </p:animEffect>
+                                  </p:childTnLst>
+                                </p:cTn>
+                              </p:par>
+                            </p:childTnLst>
+                          </p:cTn>
+                        </p:par>
+                      </p:childTnLst>
+                    </p:cTn>
+                  </p:par>
+                  <p:par>
+                    <p:cTn id="19" fill="hold">
+                      <p:stCondLst>
+                        <p:cond delay="indefinite"/>
+                      </p:stCondLst>
+                      <p:childTnLst>
+                        <p:par>
+                          <p:cTn id="20" fill="hold">
+                            <p:stCondLst>
+                              <p:cond delay="0"/>
+                            </p:stCondLst>
+                            <p:childTnLst>
+                              <p:par>
+                                <p:cTn id="21" presetID="10" presetClass="entr" presetSubtype="0" fill="hold" grpId="0" nodeType="clickEffect">
+                                  <p:stCondLst>
+                                    <p:cond delay="0"/>
+                                  </p:stCondLst>
+                                  <p:childTnLst>
+                                    <p:set>
+                                      <p:cBhvr>
+                                        <p:cTn id="22" dur="1" fill="hold">
+                                          <p:stCondLst>
+                                            <p:cond delay="0"/>
+                                          </p:stCondLst>
+                                        </p:cTn>
+                                        <p:tgtEl>
+                                          <p:spTgt spid="5"/>
+                                        </p:tgtEl>
+                                        <p:attrNameLst>
+                                          <p:attrName>style.visibility</p:attrName>
+                                        </p:attrNameLst>
+                                      </p:cBhvr>
+                                      <p:to>
+                                        <p:strVal val="visible"/>
+                                      </p:to>
+                                    </p:set>
+                                    <p:animEffect transition="in" filter="fade">
+                                      <p:cBhvr>
+                                        <p:cTn id="23" dur="500"/>
+                                        <p:tgtEl>
+                                          <p:spTgt spid="5"/>
+                                        </p:tgtEl>
+                                      </p:cBhvr>
+                                    </p:animEffect>
+                                  </p:childTnLst>
+                                </p:cTn>
+                              </p:par>
+                              <p:par>
+                                <p:cTn id="24" presetID="10" presetClass="entr" presetSubtype="0" fill="hold" grpId="0" nodeType="withEffect" nodePh="1">
+                                  <p:stCondLst>
+                                    <p:cond delay="0"/>
+                                  </p:stCondLst>
+                                  <p:endCondLst>
+                                    <p:cond evt="begin" delay="0">
+                                      <p:tn val="24"/>
+                                    </p:cond>
+                                  </p:endCondLst>
+                                  <p:childTnLst>
+                                    <p:set>
+                                      <p:cBhvr>
+                                        <p:cTn id="25" dur="1" fill="hold">
+                                          <p:stCondLst>
+                                            <p:cond delay="0"/>
+                                          </p:stCondLst>
+                                        </p:cTn>
+                                        <p:tgtEl>
+                                          <p:spTgt spid="7"/>
+                                        </p:tgtEl>
+                                        <p:attrNameLst>
+                                          <p:attrName>style.visibility</p:attrName>
+                                        </p:attrNameLst>
+                                      </p:cBhvr>
+                                      <p:to>
+                                        <p:strVal val="visible"/>
+                                      </p:to>
+                                    </p:set>
+                                    <p:animEffect transition="in" filter="fade">
+                                      <p:cBhvr>
+                                        <p:cTn id="26" dur="500"/>
+                                        <p:tgtEl>
+                                          <p:spTgt spid="7"/>
+                                        </p:tgtEl>
+                                      </p:cBhvr>
+                                    </p:animEffect>
+                                  </p:childTnLst>
+                                </p:cTn>
+                              </p:par>
+                              <p:par>
+                                <p:cTn id="27" presetID="10" presetClass="entr" presetSubtype="0" fill="hold" nodeType="withEffect">
+                                  <p:stCondLst>
+                                    <p:cond delay="0"/>
+                                  </p:stCondLst>
+                                  <p:childTnLst>
+                                    <p:set>
+                                      <p:cBhvr>
+                                        <p:cTn id="28" dur="1" fill="hold">
+                                          <p:stCondLst>
+                                            <p:cond delay="0"/>
+                                          </p:stCondLst>
+                                        </p:cTn>
+                                        <p:tgtEl>
+                                          <p:spTgt spid="9"/>
+                                        </p:tgtEl>
+                                        <p:attrNameLst>
+                                          <p:attrName>style.visibility</p:attrName>
+                                        </p:attrNameLst>
+                                      </p:cBhvr>
+                                      <p:to>
+                                        <p:strVal val="visible"/>
+                                      </p:to>
+                                    </p:set>
+                                    <p:animEffect transition="in" filter="fade">
+                                      <p:cBhvr>
+                                        <p:cTn id="29" dur="500"/>
+                                        <p:tgtEl>
+                                          <p:spTgt spid="9"/>
+                                        </p:tgtEl>
+                                      </p:cBhvr>
+                                    </p:animEffect>
+                                  </p:childTnLst>
+                                </p:cTn>
+                              </p:par>
+                            </p:childTnLst>
+                          </p:cTn>
+                        </p:par>
+                      </p:childTnLst>
+                    </p:cTn>
+                  </p:par>
+                </p:childTnLst>
+              </p:cTn>
+              <p:prevCondLst>
+                <p:cond evt="onPrev" delay="0">
+                  <p:tgtEl>
+                    <p:sldTgt/>
+                  </p:tgtEl>
+                </p:cond>
+              </p:prevCondLst>
+              <p:nextCondLst>
+                <p:cond evt="onNext" delay="0">
+                  <p:tgtEl>
+                    <p:sldTgt/>
+                  </p:tgtEl>
+                </p:cond>
+              </p:nextCondLst>
+            </p:seq>
+          </p:childTnLst>
+        </p:cTn>
+      </p:par>
+    </p:tnLst>
+    <p:bldLst>
+      <p:bldP spid="4" grpId="0"/>
+      <p:bldP spid="5" grpId="0"/>
+      <p:bldP spid="6" grpId="0"/>
+      <p:bldP spid="7" grpId="0"/>
+    </p:bldLst>
+  </p:timing>
 </p:sld>
 </file>
 
@@ -9432,6 +12374,35 @@
           </a:p>
         </p:txBody>
       </p:sp>
+      <p:sp>
+        <p:nvSpPr>
+          <p:cNvPr id="3" name="Foliennummernplatzhalter 2">
+            <a:extLst>
+              <a:ext uri="{FF2B5EF4-FFF2-40B4-BE49-F238E27FC236}">
+                <a16:creationId xmlns:a16="http://schemas.microsoft.com/office/drawing/2014/main" id="{D6DB1271-71E5-0679-3207-8FE9AC0D8D55}"/>
+              </a:ext>
+            </a:extLst>
+          </p:cNvPr>
+          <p:cNvSpPr>
+            <a:spLocks noGrp="1"/>
+          </p:cNvSpPr>
+          <p:nvPr>
+            <p:ph type="sldNum" sz="quarter" idx="12"/>
+          </p:nvPr>
+        </p:nvSpPr>
+        <p:spPr/>
+        <p:txBody>
+          <a:bodyPr/>
+          <a:lstStyle/>
+          <a:p>
+            <a:fld id="{1A401315-7350-4ECF-B456-363AC987C71C}" type="slidenum">
+              <a:rPr lang="en-GB" smtClean="0"/>
+              <a:t>6</a:t>
+            </a:fld>
+            <a:endParaRPr lang="en-GB"/>
+          </a:p>
+        </p:txBody>
+      </p:sp>
     </p:spTree>
     <p:extLst>
       <p:ext uri="{BB962C8B-B14F-4D97-AF65-F5344CB8AC3E}">
@@ -9442,6 +12413,9 @@
   <p:clrMapOvr>
     <a:masterClrMapping/>
   </p:clrMapOvr>
+  <p:transition spd="slow">
+    <p:push dir="r"/>
+  </p:transition>
 </p:sld>
 </file>
 
@@ -9532,6 +12506,35 @@
           </a:prstGeom>
         </p:spPr>
       </p:pic>
+      <p:sp>
+        <p:nvSpPr>
+          <p:cNvPr id="3" name="Foliennummernplatzhalter 2">
+            <a:extLst>
+              <a:ext uri="{FF2B5EF4-FFF2-40B4-BE49-F238E27FC236}">
+                <a16:creationId xmlns:a16="http://schemas.microsoft.com/office/drawing/2014/main" id="{B37D47D1-2E6B-1019-1210-043EC74CFB58}"/>
+              </a:ext>
+            </a:extLst>
+          </p:cNvPr>
+          <p:cNvSpPr>
+            <a:spLocks noGrp="1"/>
+          </p:cNvSpPr>
+          <p:nvPr>
+            <p:ph type="sldNum" sz="quarter" idx="12"/>
+          </p:nvPr>
+        </p:nvSpPr>
+        <p:spPr/>
+        <p:txBody>
+          <a:bodyPr/>
+          <a:lstStyle/>
+          <a:p>
+            <a:fld id="{1A401315-7350-4ECF-B456-363AC987C71C}" type="slidenum">
+              <a:rPr lang="en-GB" smtClean="0"/>
+              <a:t>7</a:t>
+            </a:fld>
+            <a:endParaRPr lang="en-GB"/>
+          </a:p>
+        </p:txBody>
+      </p:sp>
     </p:spTree>
     <p:extLst>
       <p:ext uri="{BB962C8B-B14F-4D97-AF65-F5344CB8AC3E}">
@@ -9542,6 +12545,9 @@
   <p:clrMapOvr>
     <a:masterClrMapping/>
   </p:clrMapOvr>
+  <p:transition spd="slow">
+    <p:push dir="r"/>
+  </p:transition>
 </p:sld>
 </file>
 
@@ -10104,6 +13110,35 @@
           </a:extLst>
         </p:spPr>
       </p:pic>
+      <p:sp>
+        <p:nvSpPr>
+          <p:cNvPr id="4" name="Foliennummernplatzhalter 3">
+            <a:extLst>
+              <a:ext uri="{FF2B5EF4-FFF2-40B4-BE49-F238E27FC236}">
+                <a16:creationId xmlns:a16="http://schemas.microsoft.com/office/drawing/2014/main" id="{3A408A6B-9012-B1E7-BEFA-F24EF16B0970}"/>
+              </a:ext>
+            </a:extLst>
+          </p:cNvPr>
+          <p:cNvSpPr>
+            <a:spLocks noGrp="1"/>
+          </p:cNvSpPr>
+          <p:nvPr>
+            <p:ph type="sldNum" sz="quarter" idx="12"/>
+          </p:nvPr>
+        </p:nvSpPr>
+        <p:spPr/>
+        <p:txBody>
+          <a:bodyPr/>
+          <a:lstStyle/>
+          <a:p>
+            <a:fld id="{1A401315-7350-4ECF-B456-363AC987C71C}" type="slidenum">
+              <a:rPr lang="en-GB" smtClean="0"/>
+              <a:t>8</a:t>
+            </a:fld>
+            <a:endParaRPr lang="en-GB"/>
+          </a:p>
+        </p:txBody>
+      </p:sp>
     </p:spTree>
     <p:extLst>
       <p:ext uri="{BB962C8B-B14F-4D97-AF65-F5344CB8AC3E}">
@@ -10114,6 +13149,9 @@
   <p:clrMapOvr>
     <a:masterClrMapping/>
   </p:clrMapOvr>
+  <p:transition spd="slow">
+    <p:push dir="u"/>
+  </p:transition>
 </p:sld>
 </file>
 
@@ -10204,6 +13242,35 @@
           </a:prstGeom>
         </p:spPr>
       </p:pic>
+      <p:sp>
+        <p:nvSpPr>
+          <p:cNvPr id="3" name="Foliennummernplatzhalter 2">
+            <a:extLst>
+              <a:ext uri="{FF2B5EF4-FFF2-40B4-BE49-F238E27FC236}">
+                <a16:creationId xmlns:a16="http://schemas.microsoft.com/office/drawing/2014/main" id="{E33AB3DA-26D9-13F9-2B64-58502D4B7850}"/>
+              </a:ext>
+            </a:extLst>
+          </p:cNvPr>
+          <p:cNvSpPr>
+            <a:spLocks noGrp="1"/>
+          </p:cNvSpPr>
+          <p:nvPr>
+            <p:ph type="sldNum" sz="quarter" idx="12"/>
+          </p:nvPr>
+        </p:nvSpPr>
+        <p:spPr/>
+        <p:txBody>
+          <a:bodyPr/>
+          <a:lstStyle/>
+          <a:p>
+            <a:fld id="{1A401315-7350-4ECF-B456-363AC987C71C}" type="slidenum">
+              <a:rPr lang="en-GB" smtClean="0"/>
+              <a:t>9</a:t>
+            </a:fld>
+            <a:endParaRPr lang="en-GB"/>
+          </a:p>
+        </p:txBody>
+      </p:sp>
     </p:spTree>
     <p:extLst>
       <p:ext uri="{BB962C8B-B14F-4D97-AF65-F5344CB8AC3E}">
@@ -10214,6 +13281,9 @@
   <p:clrMapOvr>
     <a:masterClrMapping/>
   </p:clrMapOvr>
+  <p:transition spd="slow">
+    <p:push dir="u"/>
+  </p:transition>
 </p:sld>
 </file>
 

</xml_diff>

<commit_message>
Vault backup: 07/04/25 13:15 XMG
</commit_message>
<xml_diff>
--- a/ITP/Von der Projektidee zum Projektauftrag.pptx
+++ b/ITP/Von der Projektidee zum Projektauftrag.pptx
@@ -216,7 +216,7 @@
           <a:p>
             <a:fld id="{D22B782B-7635-4CFD-8DEB-E3047850B87B}" type="datetimeFigureOut">
               <a:rPr lang="de-AT" smtClean="0"/>
-              <a:t>13.03.2025</a:t>
+              <a:t>20.03.2025</a:t>
             </a:fld>
             <a:endParaRPr lang="de-AT"/>
           </a:p>
@@ -694,6 +694,90 @@
   <p:cSld>
     <p:spTree>
       <p:nvGrpSpPr>
+        <p:cNvPr id="1" name=""/>
+        <p:cNvGrpSpPr/>
+        <p:nvPr/>
+      </p:nvGrpSpPr>
+      <p:grpSpPr>
+        <a:xfrm>
+          <a:off x="0" y="0"/>
+          <a:ext cx="0" cy="0"/>
+          <a:chOff x="0" y="0"/>
+          <a:chExt cx="0" cy="0"/>
+        </a:xfrm>
+      </p:grpSpPr>
+      <p:sp>
+        <p:nvSpPr>
+          <p:cNvPr id="2" name="Folienbildplatzhalter 1"/>
+          <p:cNvSpPr>
+            <a:spLocks noGrp="1" noRot="1" noChangeAspect="1"/>
+          </p:cNvSpPr>
+          <p:nvPr>
+            <p:ph type="sldImg"/>
+          </p:nvPr>
+        </p:nvSpPr>
+        <p:spPr/>
+      </p:sp>
+      <p:sp>
+        <p:nvSpPr>
+          <p:cNvPr id="3" name="Notizenplatzhalter 2"/>
+          <p:cNvSpPr>
+            <a:spLocks noGrp="1"/>
+          </p:cNvSpPr>
+          <p:nvPr>
+            <p:ph type="body" idx="1"/>
+          </p:nvPr>
+        </p:nvSpPr>
+        <p:spPr/>
+        <p:txBody>
+          <a:bodyPr/>
+          <a:lstStyle/>
+          <a:p>
+            <a:endParaRPr lang="en-GB"/>
+          </a:p>
+        </p:txBody>
+      </p:sp>
+      <p:sp>
+        <p:nvSpPr>
+          <p:cNvPr id="4" name="Foliennummernplatzhalter 3"/>
+          <p:cNvSpPr>
+            <a:spLocks noGrp="1"/>
+          </p:cNvSpPr>
+          <p:nvPr>
+            <p:ph type="sldNum" sz="quarter" idx="5"/>
+          </p:nvPr>
+        </p:nvSpPr>
+        <p:spPr/>
+        <p:txBody>
+          <a:bodyPr/>
+          <a:lstStyle/>
+          <a:p>
+            <a:fld id="{42F1E68F-BF1A-45B0-841D-982DA2AC4570}" type="slidenum">
+              <a:rPr lang="de-AT" smtClean="0"/>
+              <a:t>5</a:t>
+            </a:fld>
+            <a:endParaRPr lang="de-AT"/>
+          </a:p>
+        </p:txBody>
+      </p:sp>
+    </p:spTree>
+    <p:extLst>
+      <p:ext uri="{BB962C8B-B14F-4D97-AF65-F5344CB8AC3E}">
+        <p14:creationId xmlns:p14="http://schemas.microsoft.com/office/powerpoint/2010/main" val="1770040532"/>
+      </p:ext>
+    </p:extLst>
+  </p:cSld>
+  <p:clrMapOvr>
+    <a:masterClrMapping/>
+  </p:clrMapOvr>
+</p:notes>
+</file>
+
+<file path=ppt/notesSlides/notesSlide4.xml><?xml version="1.0" encoding="utf-8"?>
+<p:notes xmlns:a="http://schemas.openxmlformats.org/drawingml/2006/main" xmlns:r="http://schemas.openxmlformats.org/officeDocument/2006/relationships" xmlns:p="http://schemas.openxmlformats.org/presentationml/2006/main">
+  <p:cSld>
+    <p:spTree>
+      <p:nvGrpSpPr>
         <p:cNvPr id="1" name="">
           <a:extLst>
             <a:ext uri="{FF2B5EF4-FFF2-40B4-BE49-F238E27FC236}">
@@ -806,7 +890,7 @@
 </p:notes>
 </file>
 
-<file path=ppt/notesSlides/notesSlide4.xml><?xml version="1.0" encoding="utf-8"?>
+<file path=ppt/notesSlides/notesSlide5.xml><?xml version="1.0" encoding="utf-8"?>
 <p:notes xmlns:a="http://schemas.openxmlformats.org/drawingml/2006/main" xmlns:r="http://schemas.openxmlformats.org/officeDocument/2006/relationships" xmlns:p="http://schemas.openxmlformats.org/presentationml/2006/main">
   <p:cSld>
     <p:spTree>
@@ -899,7 +983,7 @@
 </p:notes>
 </file>
 
-<file path=ppt/notesSlides/notesSlide5.xml><?xml version="1.0" encoding="utf-8"?>
+<file path=ppt/notesSlides/notesSlide6.xml><?xml version="1.0" encoding="utf-8"?>
 <p:notes xmlns:a="http://schemas.openxmlformats.org/drawingml/2006/main" xmlns:r="http://schemas.openxmlformats.org/officeDocument/2006/relationships" xmlns:p="http://schemas.openxmlformats.org/presentationml/2006/main">
   <p:cSld>
     <p:spTree>
@@ -1016,7 +1100,7 @@
 </p:notes>
 </file>
 
-<file path=ppt/notesSlides/notesSlide6.xml><?xml version="1.0" encoding="utf-8"?>
+<file path=ppt/notesSlides/notesSlide7.xml><?xml version="1.0" encoding="utf-8"?>
 <p:notes xmlns:a="http://schemas.openxmlformats.org/drawingml/2006/main" xmlns:r="http://schemas.openxmlformats.org/officeDocument/2006/relationships" xmlns:p="http://schemas.openxmlformats.org/presentationml/2006/main">
   <p:cSld>
     <p:spTree>
@@ -1100,7 +1184,7 @@
 </p:notes>
 </file>
 
-<file path=ppt/notesSlides/notesSlide7.xml><?xml version="1.0" encoding="utf-8"?>
+<file path=ppt/notesSlides/notesSlide8.xml><?xml version="1.0" encoding="utf-8"?>
 <p:notes xmlns:a="http://schemas.openxmlformats.org/drawingml/2006/main" xmlns:r="http://schemas.openxmlformats.org/officeDocument/2006/relationships" xmlns:p="http://schemas.openxmlformats.org/presentationml/2006/main">
   <p:cSld>
     <p:spTree>
@@ -1333,7 +1417,7 @@
           <a:p>
             <a:fld id="{F4B13AFC-D0EF-42CA-A9E1-58A372A8B7DA}" type="datetime1">
               <a:rPr lang="en-GB" smtClean="0"/>
-              <a:t>13/03/2025</a:t>
+              <a:t>20/03/2025</a:t>
             </a:fld>
             <a:endParaRPr lang="en-GB"/>
           </a:p>
@@ -1533,7 +1617,7 @@
           <a:p>
             <a:fld id="{D91BC2AF-CECD-41EB-91D8-FC814B19D2BB}" type="datetime1">
               <a:rPr lang="en-GB" smtClean="0"/>
-              <a:t>13/03/2025</a:t>
+              <a:t>20/03/2025</a:t>
             </a:fld>
             <a:endParaRPr lang="en-GB"/>
           </a:p>
@@ -1743,7 +1827,7 @@
           <a:p>
             <a:fld id="{9825354E-F563-4111-BF58-E038845F1B7E}" type="datetime1">
               <a:rPr lang="en-GB" smtClean="0"/>
-              <a:t>13/03/2025</a:t>
+              <a:t>20/03/2025</a:t>
             </a:fld>
             <a:endParaRPr lang="en-GB"/>
           </a:p>
@@ -1943,7 +2027,7 @@
           <a:p>
             <a:fld id="{B2E8A175-7921-478E-BE30-519E05C548DB}" type="datetime1">
               <a:rPr lang="en-GB" smtClean="0"/>
-              <a:t>13/03/2025</a:t>
+              <a:t>20/03/2025</a:t>
             </a:fld>
             <a:endParaRPr lang="en-GB"/>
           </a:p>
@@ -2219,7 +2303,7 @@
           <a:p>
             <a:fld id="{0E9F0052-14E0-4315-85A1-03492097AA66}" type="datetime1">
               <a:rPr lang="en-GB" smtClean="0"/>
-              <a:t>13/03/2025</a:t>
+              <a:t>20/03/2025</a:t>
             </a:fld>
             <a:endParaRPr lang="en-GB"/>
           </a:p>
@@ -2487,7 +2571,7 @@
           <a:p>
             <a:fld id="{9F578F3E-2837-4FC3-A98E-88409A1BA321}" type="datetime1">
               <a:rPr lang="en-GB" smtClean="0"/>
-              <a:t>13/03/2025</a:t>
+              <a:t>20/03/2025</a:t>
             </a:fld>
             <a:endParaRPr lang="en-GB"/>
           </a:p>
@@ -2902,7 +2986,7 @@
           <a:p>
             <a:fld id="{DD8E2323-7188-4091-9719-693FAB1EE299}" type="datetime1">
               <a:rPr lang="en-GB" smtClean="0"/>
-              <a:t>13/03/2025</a:t>
+              <a:t>20/03/2025</a:t>
             </a:fld>
             <a:endParaRPr lang="en-GB"/>
           </a:p>
@@ -3044,7 +3128,7 @@
           <a:p>
             <a:fld id="{03B07AAD-9123-458D-9073-B61A0EAD2087}" type="datetime1">
               <a:rPr lang="en-GB" smtClean="0"/>
-              <a:t>13/03/2025</a:t>
+              <a:t>20/03/2025</a:t>
             </a:fld>
             <a:endParaRPr lang="en-GB"/>
           </a:p>
@@ -3157,7 +3241,7 @@
           <a:p>
             <a:fld id="{1D1E95BF-9BCF-4C35-929E-D3124F7D5CDC}" type="datetime1">
               <a:rPr lang="en-GB" smtClean="0"/>
-              <a:t>13/03/2025</a:t>
+              <a:t>20/03/2025</a:t>
             </a:fld>
             <a:endParaRPr lang="en-GB"/>
           </a:p>
@@ -3470,7 +3554,7 @@
           <a:p>
             <a:fld id="{CA6077BB-E0EC-46B9-9FE5-7928F75384FA}" type="datetime1">
               <a:rPr lang="en-GB" smtClean="0"/>
-              <a:t>13/03/2025</a:t>
+              <a:t>20/03/2025</a:t>
             </a:fld>
             <a:endParaRPr lang="en-GB"/>
           </a:p>
@@ -3759,7 +3843,7 @@
           <a:p>
             <a:fld id="{1F4A9EC9-4DB4-4BE4-A4EA-242B40676557}" type="datetime1">
               <a:rPr lang="en-GB" smtClean="0"/>
-              <a:t>13/03/2025</a:t>
+              <a:t>20/03/2025</a:t>
             </a:fld>
             <a:endParaRPr lang="en-GB"/>
           </a:p>
@@ -4002,7 +4086,7 @@
           <a:p>
             <a:fld id="{CA0D09B7-194B-45C4-ABD1-A6D48D52B8B9}" type="datetime1">
               <a:rPr lang="en-GB" smtClean="0"/>
-              <a:t>13/03/2025</a:t>
+              <a:t>20/03/2025</a:t>
             </a:fld>
             <a:endParaRPr lang="en-GB"/>
           </a:p>
@@ -9801,88 +9885,77 @@
           <a:chExt cx="0" cy="0"/>
         </a:xfrm>
       </p:grpSpPr>
-      <p:sp useBgFill="1">
-        <p:nvSpPr>
-          <p:cNvPr id="5136" name="Rectangle 5135">
-            <a:extLst>
-              <a:ext uri="{FF2B5EF4-FFF2-40B4-BE49-F238E27FC236}">
-                <a16:creationId xmlns:a16="http://schemas.microsoft.com/office/drawing/2014/main" id="{FFCDD23B-75C8-427B-BD08-53C8156CD7CD}"/>
-              </a:ext>
-              <a:ext uri="{C183D7F6-B498-43B3-948B-1728B52AA6E4}">
-                <adec:decorative xmlns:adec="http://schemas.microsoft.com/office/drawing/2017/decorative" val="1"/>
-              </a:ext>
-            </a:extLst>
-          </p:cNvPr>
-          <p:cNvSpPr>
-            <a:spLocks noGrp="1" noRot="1" noChangeAspect="1" noMove="1" noResize="1" noEditPoints="1" noAdjustHandles="1" noChangeArrowheads="1" noChangeShapeType="1" noTextEdit="1"/>
-          </p:cNvSpPr>
-          <p:nvPr>
-            <p:extLst>
-              <p:ext uri="{386F3935-93C4-4BCD-93E2-E3B085C9AB24}">
-                <p16:designElem xmlns:p16="http://schemas.microsoft.com/office/powerpoint/2015/main" val="1"/>
-              </p:ext>
-            </p:extLst>
+      <p:sp>
+        <p:nvSpPr>
+          <p:cNvPr id="2" name="Titel 1">
+            <a:extLst>
+              <a:ext uri="{FF2B5EF4-FFF2-40B4-BE49-F238E27FC236}">
+                <a16:creationId xmlns:a16="http://schemas.microsoft.com/office/drawing/2014/main" id="{60993971-D976-35BC-95C2-636643BEE66D}"/>
+              </a:ext>
+            </a:extLst>
+          </p:cNvPr>
+          <p:cNvSpPr>
+            <a:spLocks noGrp="1"/>
+          </p:cNvSpPr>
+          <p:nvPr>
+            <p:ph type="ctrTitle"/>
           </p:nvPr>
         </p:nvSpPr>
         <p:spPr>
           <a:xfrm>
-            <a:off x="-2" y="0"/>
-            <a:ext cx="12192000" cy="6858000"/>
+            <a:off x="762001" y="5074024"/>
+            <a:ext cx="10109199" cy="598032"/>
+          </a:xfrm>
+        </p:spPr>
+        <p:txBody>
+          <a:bodyPr vert="horz" lIns="91440" tIns="45720" rIns="91440" bIns="45720" rtlCol="0" anchor="ctr">
+            <a:normAutofit/>
+          </a:bodyPr>
+          <a:lstStyle/>
+          <a:p>
+            <a:pPr algn="l"/>
+            <a:r>
+              <a:rPr lang="en-US" sz="3600"/>
+              <a:t>Vielen Dank für eure Aufmerksamkeit!</a:t>
+            </a:r>
+          </a:p>
+        </p:txBody>
+      </p:sp>
+      <p:pic>
+        <p:nvPicPr>
+          <p:cNvPr id="4" name="Grafik 3" descr="Ein Bild, das draußen enthält.&#10;&#10;KI-generierte Inhalte können fehlerhaft sein.">
+            <a:extLst>
+              <a:ext uri="{FF2B5EF4-FFF2-40B4-BE49-F238E27FC236}">
+                <a16:creationId xmlns:a16="http://schemas.microsoft.com/office/drawing/2014/main" id="{DC72D1F9-BAD2-6820-65C8-89209131B823}"/>
+              </a:ext>
+            </a:extLst>
+          </p:cNvPr>
+          <p:cNvPicPr>
+            <a:picLocks noChangeAspect="1"/>
+          </p:cNvPicPr>
+          <p:nvPr/>
+        </p:nvPicPr>
+        <p:blipFill>
+          <a:blip r:embed="rId2"/>
+          <a:srcRect l="2842" r="-3" b="-3"/>
+          <a:stretch/>
+        </p:blipFill>
+        <p:spPr>
+          <a:xfrm>
+            <a:off x="20" y="3"/>
+            <a:ext cx="4062634" cy="4172786"/>
           </a:xfrm>
           <a:prstGeom prst="rect">
             <a:avLst/>
           </a:prstGeom>
-          <a:ln w="12700" cap="flat" cmpd="sng" algn="ctr">
-            <a:noFill/>
-            <a:prstDash val="solid"/>
-            <a:miter lim="800000"/>
-          </a:ln>
-          <a:effectLst/>
-          <a:extLst>
-            <a:ext uri="{91240B29-F687-4F45-9708-019B960494DF}">
-              <a14:hiddenLine xmlns:a14="http://schemas.microsoft.com/office/drawing/2010/main" w="12700" cap="flat" cmpd="sng" algn="ctr">
-                <a:solidFill>
-                  <a:schemeClr val="accent1">
-                    <a:shade val="50000"/>
-                  </a:schemeClr>
-                </a:solidFill>
-                <a:prstDash val="solid"/>
-                <a:miter lim="800000"/>
-              </a14:hiddenLine>
-            </a:ext>
-          </a:extLst>
         </p:spPr>
-        <p:style>
-          <a:lnRef idx="2">
-            <a:schemeClr val="accent1">
-              <a:shade val="50000"/>
-            </a:schemeClr>
-          </a:lnRef>
-          <a:fillRef idx="1">
-            <a:schemeClr val="accent1"/>
-          </a:fillRef>
-          <a:effectRef idx="0">
-            <a:schemeClr val="accent1"/>
-          </a:effectRef>
-          <a:fontRef idx="minor">
-            <a:schemeClr val="lt1"/>
-          </a:fontRef>
-        </p:style>
-        <p:txBody>
-          <a:bodyPr rtlCol="0" anchor="ctr"/>
-          <a:lstStyle/>
-          <a:p>
-            <a:pPr algn="ctr"/>
-            <a:endParaRPr lang="en-US"/>
-          </a:p>
-        </p:txBody>
-      </p:sp>
+      </p:pic>
       <p:pic>
         <p:nvPicPr>
-          <p:cNvPr id="5122" name="Picture 2" descr="Vielen dank für eure aufmerksamkeit -Fotos und -Bildmaterial in hoher  Auflösung – Alamy">
-            <a:extLst>
-              <a:ext uri="{FF2B5EF4-FFF2-40B4-BE49-F238E27FC236}">
-                <a16:creationId xmlns:a16="http://schemas.microsoft.com/office/drawing/2014/main" id="{1539A5E9-3318-6B83-0CA0-DD1E7A5E48B9}"/>
+          <p:cNvPr id="5124" name="Picture 4" descr="Poster, Print Portrait of a Sleazy Businessman Showing Contract, 40x33.9 cm">
+            <a:extLst>
+              <a:ext uri="{FF2B5EF4-FFF2-40B4-BE49-F238E27FC236}">
+                <a16:creationId xmlns:a16="http://schemas.microsoft.com/office/drawing/2014/main" id="{56ECA197-22ED-7560-10CD-E0A689A33AB5}"/>
               </a:ext>
             </a:extLst>
           </p:cNvPr>
@@ -9892,20 +9965,20 @@
           <p:nvPr/>
         </p:nvPicPr>
         <p:blipFill>
-          <a:blip r:embed="rId2">
+          <a:blip r:embed="rId3">
             <a:extLst>
               <a:ext uri="{28A0092B-C50C-407E-A947-70E740481C1C}">
                 <a14:useLocalDpi xmlns:a14="http://schemas.microsoft.com/office/drawing/2010/main" val="0"/>
               </a:ext>
             </a:extLst>
           </a:blip>
-          <a:srcRect t="3873" r="-1" b="15766"/>
+          <a:srcRect l="12493" r="4993" b="-1"/>
           <a:stretch/>
         </p:blipFill>
         <p:spPr bwMode="auto">
           <a:xfrm>
-            <a:off x="-1" y="190"/>
-            <a:ext cx="8128855" cy="5291194"/>
+            <a:off x="4061976" y="10"/>
+            <a:ext cx="4062654" cy="4172778"/>
           </a:xfrm>
           <a:prstGeom prst="rect">
             <a:avLst/>
@@ -9922,277 +9995,12 @@
           </a:extLst>
         </p:spPr>
       </p:pic>
-      <p:sp>
-        <p:nvSpPr>
-          <p:cNvPr id="5138" name="Rectangle 5137">
-            <a:extLst>
-              <a:ext uri="{FF2B5EF4-FFF2-40B4-BE49-F238E27FC236}">
-                <a16:creationId xmlns:a16="http://schemas.microsoft.com/office/drawing/2014/main" id="{AFFC87AC-C919-4FE5-BAC3-39509E001152}"/>
-              </a:ext>
-              <a:ext uri="{C183D7F6-B498-43B3-948B-1728B52AA6E4}">
-                <adec:decorative xmlns:adec="http://schemas.microsoft.com/office/drawing/2017/decorative" val="1"/>
-              </a:ext>
-            </a:extLst>
-          </p:cNvPr>
-          <p:cNvSpPr>
-            <a:spLocks noGrp="1" noRot="1" noChangeAspect="1" noMove="1" noResize="1" noEditPoints="1" noAdjustHandles="1" noChangeArrowheads="1" noChangeShapeType="1" noTextEdit="1"/>
-          </p:cNvSpPr>
-          <p:nvPr>
-            <p:extLst>
-              <p:ext uri="{386F3935-93C4-4BCD-93E2-E3B085C9AB24}">
-                <p16:designElem xmlns:p16="http://schemas.microsoft.com/office/powerpoint/2015/main" val="1"/>
-              </p:ext>
-            </p:extLst>
-          </p:nvPr>
-        </p:nvSpPr>
-        <p:spPr>
-          <a:xfrm flipH="1">
-            <a:off x="-264" y="5282206"/>
-            <a:ext cx="12192264" cy="1163844"/>
-          </a:xfrm>
-          <a:prstGeom prst="rect">
-            <a:avLst/>
-          </a:prstGeom>
-          <a:gradFill>
-            <a:gsLst>
-              <a:gs pos="28000">
-                <a:schemeClr val="accent1">
-                  <a:lumMod val="75000"/>
-                  <a:alpha val="11000"/>
-                </a:schemeClr>
-              </a:gs>
-              <a:gs pos="100000">
-                <a:srgbClr val="000000">
-                  <a:alpha val="77000"/>
-                </a:srgbClr>
-              </a:gs>
-            </a:gsLst>
-            <a:lin ang="12600000" scaled="0"/>
-          </a:gradFill>
-          <a:ln>
-            <a:noFill/>
-          </a:ln>
-        </p:spPr>
-        <p:style>
-          <a:lnRef idx="2">
-            <a:schemeClr val="accent1">
-              <a:shade val="50000"/>
-            </a:schemeClr>
-          </a:lnRef>
-          <a:fillRef idx="1">
-            <a:schemeClr val="accent1"/>
-          </a:fillRef>
-          <a:effectRef idx="0">
-            <a:schemeClr val="accent1"/>
-          </a:effectRef>
-          <a:fontRef idx="minor">
-            <a:schemeClr val="lt1"/>
-          </a:fontRef>
-        </p:style>
-        <p:txBody>
-          <a:bodyPr rtlCol="0" anchor="ctr"/>
-          <a:lstStyle/>
-          <a:p>
-            <a:pPr algn="ctr"/>
-            <a:endParaRPr lang="en-US" dirty="0"/>
-          </a:p>
-        </p:txBody>
-      </p:sp>
-      <p:sp>
-        <p:nvSpPr>
-          <p:cNvPr id="5140" name="Rectangle 5139">
-            <a:extLst>
-              <a:ext uri="{FF2B5EF4-FFF2-40B4-BE49-F238E27FC236}">
-                <a16:creationId xmlns:a16="http://schemas.microsoft.com/office/drawing/2014/main" id="{AB5E08C4-8CDD-4623-A5B8-E998C6DEE3B7}"/>
-              </a:ext>
-              <a:ext uri="{C183D7F6-B498-43B3-948B-1728B52AA6E4}">
-                <adec:decorative xmlns:adec="http://schemas.microsoft.com/office/drawing/2017/decorative" val="1"/>
-              </a:ext>
-            </a:extLst>
-          </p:cNvPr>
-          <p:cNvSpPr>
-            <a:spLocks noGrp="1" noRot="1" noChangeAspect="1" noMove="1" noResize="1" noEditPoints="1" noAdjustHandles="1" noChangeArrowheads="1" noChangeShapeType="1" noTextEdit="1"/>
-          </p:cNvSpPr>
-          <p:nvPr>
-            <p:extLst>
-              <p:ext uri="{386F3935-93C4-4BCD-93E2-E3B085C9AB24}">
-                <p16:designElem xmlns:p16="http://schemas.microsoft.com/office/powerpoint/2015/main" val="1"/>
-              </p:ext>
-            </p:extLst>
-          </p:nvPr>
-        </p:nvSpPr>
-        <p:spPr>
-          <a:xfrm flipH="1">
-            <a:off x="2" y="5282206"/>
-            <a:ext cx="12191998" cy="1586485"/>
-          </a:xfrm>
-          <a:prstGeom prst="rect">
-            <a:avLst/>
-          </a:prstGeom>
-          <a:gradFill>
-            <a:gsLst>
-              <a:gs pos="0">
-                <a:srgbClr val="000000">
-                  <a:alpha val="96000"/>
-                </a:srgbClr>
-              </a:gs>
-              <a:gs pos="100000">
-                <a:schemeClr val="accent1"/>
-              </a:gs>
-            </a:gsLst>
-            <a:lin ang="8400000" scaled="0"/>
-          </a:gradFill>
-          <a:ln>
-            <a:noFill/>
-          </a:ln>
-        </p:spPr>
-        <p:style>
-          <a:lnRef idx="2">
-            <a:schemeClr val="accent1">
-              <a:shade val="50000"/>
-            </a:schemeClr>
-          </a:lnRef>
-          <a:fillRef idx="1">
-            <a:schemeClr val="accent1"/>
-          </a:fillRef>
-          <a:effectRef idx="0">
-            <a:schemeClr val="accent1"/>
-          </a:effectRef>
-          <a:fontRef idx="minor">
-            <a:schemeClr val="lt1"/>
-          </a:fontRef>
-        </p:style>
-        <p:txBody>
-          <a:bodyPr rtlCol="0" anchor="ctr"/>
-          <a:lstStyle/>
-          <a:p>
-            <a:pPr algn="ctr"/>
-            <a:endParaRPr lang="en-US"/>
-          </a:p>
-        </p:txBody>
-      </p:sp>
-      <p:sp>
-        <p:nvSpPr>
-          <p:cNvPr id="2" name="Titel 1">
-            <a:extLst>
-              <a:ext uri="{FF2B5EF4-FFF2-40B4-BE49-F238E27FC236}">
-                <a16:creationId xmlns:a16="http://schemas.microsoft.com/office/drawing/2014/main" id="{60993971-D976-35BC-95C2-636643BEE66D}"/>
-              </a:ext>
-            </a:extLst>
-          </p:cNvPr>
-          <p:cNvSpPr>
-            <a:spLocks noGrp="1"/>
-          </p:cNvSpPr>
-          <p:nvPr>
-            <p:ph type="ctrTitle"/>
-          </p:nvPr>
-        </p:nvSpPr>
-        <p:spPr>
-          <a:xfrm>
-            <a:off x="699715" y="5635366"/>
-            <a:ext cx="7091299" cy="898581"/>
-          </a:xfrm>
-        </p:spPr>
-        <p:txBody>
-          <a:bodyPr vert="horz" lIns="91440" tIns="45720" rIns="91440" bIns="45720" rtlCol="0" anchor="ctr">
-            <a:normAutofit fontScale="90000"/>
-          </a:bodyPr>
-          <a:lstStyle/>
-          <a:p>
-            <a:pPr algn="l"/>
-            <a:r>
-              <a:rPr lang="en-US" sz="3400">
-                <a:solidFill>
-                  <a:srgbClr val="FFFFFF"/>
-                </a:solidFill>
-              </a:rPr>
-              <a:t>Vielen Dank für eure Aufmerksamkeit!</a:t>
-            </a:r>
-          </a:p>
-        </p:txBody>
-      </p:sp>
-      <p:sp>
-        <p:nvSpPr>
-          <p:cNvPr id="5142" name="Rectangle 5141">
-            <a:extLst>
-              <a:ext uri="{FF2B5EF4-FFF2-40B4-BE49-F238E27FC236}">
-                <a16:creationId xmlns:a16="http://schemas.microsoft.com/office/drawing/2014/main" id="{15F33878-D502-4FFA-8ACE-F2AECDB2A23F}"/>
-              </a:ext>
-              <a:ext uri="{C183D7F6-B498-43B3-948B-1728B52AA6E4}">
-                <adec:decorative xmlns:adec="http://schemas.microsoft.com/office/drawing/2017/decorative" val="1"/>
-              </a:ext>
-            </a:extLst>
-          </p:cNvPr>
-          <p:cNvSpPr>
-            <a:spLocks noGrp="1" noRot="1" noChangeAspect="1" noMove="1" noResize="1" noEditPoints="1" noAdjustHandles="1" noChangeArrowheads="1" noChangeShapeType="1" noTextEdit="1"/>
-          </p:cNvSpPr>
-          <p:nvPr>
-            <p:extLst>
-              <p:ext uri="{386F3935-93C4-4BCD-93E2-E3B085C9AB24}">
-                <p16:designElem xmlns:p16="http://schemas.microsoft.com/office/powerpoint/2015/main" val="1"/>
-              </p:ext>
-            </p:extLst>
-          </p:nvPr>
-        </p:nvSpPr>
-        <p:spPr>
-          <a:xfrm rot="10800000" flipH="1">
-            <a:off x="8128857" y="5282206"/>
-            <a:ext cx="4063143" cy="1576412"/>
-          </a:xfrm>
-          <a:prstGeom prst="rect">
-            <a:avLst/>
-          </a:prstGeom>
-          <a:gradFill>
-            <a:gsLst>
-              <a:gs pos="19000">
-                <a:schemeClr val="accent1">
-                  <a:lumMod val="50000"/>
-                  <a:alpha val="68000"/>
-                </a:schemeClr>
-              </a:gs>
-              <a:gs pos="100000">
-                <a:schemeClr val="accent1">
-                  <a:alpha val="79000"/>
-                </a:schemeClr>
-              </a:gs>
-            </a:gsLst>
-            <a:lin ang="19200000" scaled="0"/>
-          </a:gradFill>
-          <a:ln>
-            <a:noFill/>
-          </a:ln>
-        </p:spPr>
-        <p:style>
-          <a:lnRef idx="2">
-            <a:schemeClr val="accent1">
-              <a:shade val="50000"/>
-            </a:schemeClr>
-          </a:lnRef>
-          <a:fillRef idx="1">
-            <a:schemeClr val="accent1"/>
-          </a:fillRef>
-          <a:effectRef idx="0">
-            <a:schemeClr val="accent1"/>
-          </a:effectRef>
-          <a:fontRef idx="minor">
-            <a:schemeClr val="lt1"/>
-          </a:fontRef>
-        </p:style>
-        <p:txBody>
-          <a:bodyPr rtlCol="0" anchor="ctr"/>
-          <a:lstStyle/>
-          <a:p>
-            <a:pPr algn="ctr"/>
-            <a:endParaRPr lang="en-US"/>
-          </a:p>
-        </p:txBody>
-      </p:sp>
       <p:pic>
         <p:nvPicPr>
-          <p:cNvPr id="5124" name="Picture 4" descr="Poster, Print Portrait of a Sleazy Businessman Showing Contract, 40x33.9 cm">
-            <a:extLst>
-              <a:ext uri="{FF2B5EF4-FFF2-40B4-BE49-F238E27FC236}">
-                <a16:creationId xmlns:a16="http://schemas.microsoft.com/office/drawing/2014/main" id="{56ECA197-22ED-7560-10CD-E0A689A33AB5}"/>
+          <p:cNvPr id="5122" name="Picture 2" descr="Vielen dank für eure aufmerksamkeit -Fotos und -Bildmaterial in hoher  Auflösung – Alamy">
+            <a:extLst>
+              <a:ext uri="{FF2B5EF4-FFF2-40B4-BE49-F238E27FC236}">
+                <a16:creationId xmlns:a16="http://schemas.microsoft.com/office/drawing/2014/main" id="{1539A5E9-3318-6B83-0CA0-DD1E7A5E48B9}"/>
               </a:ext>
             </a:extLst>
           </p:cNvPr>
@@ -10202,20 +10010,20 @@
           <p:nvPr/>
         </p:nvPicPr>
         <p:blipFill>
-          <a:blip r:embed="rId3">
+          <a:blip r:embed="rId4">
             <a:extLst>
               <a:ext uri="{28A0092B-C50C-407E-A947-70E740481C1C}">
                 <a14:useLocalDpi xmlns:a14="http://schemas.microsoft.com/office/drawing/2010/main" val="0"/>
               </a:ext>
             </a:extLst>
           </a:blip>
-          <a:srcRect l="21211" r="13712" b="1"/>
+          <a:srcRect l="10710" r="10336"/>
           <a:stretch/>
         </p:blipFill>
         <p:spPr bwMode="auto">
           <a:xfrm>
-            <a:off x="8128856" y="1"/>
-            <a:ext cx="4063143" cy="5291384"/>
+            <a:off x="8124630" y="-1"/>
+            <a:ext cx="4067370" cy="4172787"/>
           </a:xfrm>
           <a:prstGeom prst="rect">
             <a:avLst/>
@@ -10232,6 +10040,58 @@
           </a:extLst>
         </p:spPr>
       </p:pic>
+      <p:cxnSp>
+        <p:nvCxnSpPr>
+          <p:cNvPr id="5147" name="Straight Connector 5146">
+            <a:extLst>
+              <a:ext uri="{FF2B5EF4-FFF2-40B4-BE49-F238E27FC236}">
+                <a16:creationId xmlns:a16="http://schemas.microsoft.com/office/drawing/2014/main" id="{7667AA61-5C27-F30F-D229-06CBE5709F33}"/>
+              </a:ext>
+              <a:ext uri="{C183D7F6-B498-43B3-948B-1728B52AA6E4}">
+                <adec:decorative xmlns:adec="http://schemas.microsoft.com/office/drawing/2017/decorative" val="1"/>
+              </a:ext>
+            </a:extLst>
+          </p:cNvPr>
+          <p:cNvCxnSpPr>
+            <a:cxnSpLocks noGrp="1" noRot="1" noChangeAspect="1" noMove="1" noResize="1" noEditPoints="1" noAdjustHandles="1" noChangeArrowheads="1" noChangeShapeType="1"/>
+          </p:cNvCxnSpPr>
+          <p:nvPr>
+            <p:extLst>
+              <p:ext uri="{386F3935-93C4-4BCD-93E2-E3B085C9AB24}">
+                <p16:designElem xmlns:p16="http://schemas.microsoft.com/office/powerpoint/2015/main" val="1"/>
+              </p:ext>
+            </p:extLst>
+          </p:nvPr>
+        </p:nvCxnSpPr>
+        <p:spPr>
+          <a:xfrm>
+            <a:off x="865141" y="4811517"/>
+            <a:ext cx="736939" cy="0"/>
+          </a:xfrm>
+          <a:prstGeom prst="line">
+            <a:avLst/>
+          </a:prstGeom>
+          <a:ln w="57150">
+            <a:solidFill>
+              <a:schemeClr val="accent4"/>
+            </a:solidFill>
+          </a:ln>
+        </p:spPr>
+        <p:style>
+          <a:lnRef idx="1">
+            <a:schemeClr val="accent1"/>
+          </a:lnRef>
+          <a:fillRef idx="0">
+            <a:schemeClr val="accent1"/>
+          </a:fillRef>
+          <a:effectRef idx="0">
+            <a:schemeClr val="accent1"/>
+          </a:effectRef>
+          <a:fontRef idx="minor">
+            <a:schemeClr val="tx1"/>
+          </a:fontRef>
+        </p:style>
+      </p:cxnSp>
       <p:sp>
         <p:nvSpPr>
           <p:cNvPr id="3" name="Foliennummernplatzhalter 2">
@@ -10248,13 +10108,30 @@
             <p:ph type="sldNum" sz="quarter" idx="12"/>
           </p:nvPr>
         </p:nvSpPr>
-        <p:spPr/>
-        <p:txBody>
-          <a:bodyPr/>
-          <a:lstStyle/>
-          <a:p>
+        <p:spPr>
+          <a:xfrm>
+            <a:off x="8610600" y="6356350"/>
+            <a:ext cx="2743200" cy="365125"/>
+          </a:xfrm>
+        </p:spPr>
+        <p:txBody>
+          <a:bodyPr>
+            <a:normAutofit/>
+          </a:bodyPr>
+          <a:lstStyle/>
+          <a:p>
+            <a:pPr>
+              <a:spcAft>
+                <a:spcPts val="600"/>
+              </a:spcAft>
+            </a:pPr>
             <a:fld id="{1A401315-7350-4ECF-B456-363AC987C71C}" type="slidenum">
               <a:rPr lang="en-GB" smtClean="0"/>
+              <a:pPr>
+                <a:spcAft>
+                  <a:spcPts val="600"/>
+                </a:spcAft>
+              </a:pPr>
               <a:t>19</a:t>
             </a:fld>
             <a:endParaRPr lang="en-GB"/>
@@ -10982,6 +10859,60 @@
           </a:p>
         </p:txBody>
       </p:sp>
+      <p:pic>
+        <p:nvPicPr>
+          <p:cNvPr id="5" name="Grafik 4">
+            <a:extLst>
+              <a:ext uri="{FF2B5EF4-FFF2-40B4-BE49-F238E27FC236}">
+                <a16:creationId xmlns:a16="http://schemas.microsoft.com/office/drawing/2014/main" id="{E19D9352-A728-A33C-406C-62A38443614F}"/>
+              </a:ext>
+            </a:extLst>
+          </p:cNvPr>
+          <p:cNvPicPr>
+            <a:picLocks noChangeAspect="1"/>
+          </p:cNvPicPr>
+          <p:nvPr/>
+        </p:nvPicPr>
+        <p:blipFill>
+          <a:blip r:embed="rId4"/>
+          <a:stretch>
+            <a:fillRect/>
+          </a:stretch>
+        </p:blipFill>
+        <p:spPr>
+          <a:xfrm>
+            <a:off x="500344" y="5160578"/>
+            <a:ext cx="1381204" cy="1378333"/>
+          </a:xfrm>
+          <a:prstGeom prst="roundRect">
+            <a:avLst>
+              <a:gd name="adj" fmla="val 16667"/>
+            </a:avLst>
+          </a:prstGeom>
+          <a:ln>
+            <a:noFill/>
+          </a:ln>
+          <a:effectLst>
+            <a:outerShdw blurRad="152400" dist="12000" dir="900000" sy="98000" kx="110000" ky="200000" algn="tl" rotWithShape="0">
+              <a:srgbClr val="000000">
+                <a:alpha val="30000"/>
+              </a:srgbClr>
+            </a:outerShdw>
+          </a:effectLst>
+          <a:scene3d>
+            <a:camera prst="perspectiveRelaxed">
+              <a:rot lat="19800000" lon="1200000" rev="20820000"/>
+            </a:camera>
+            <a:lightRig rig="threePt" dir="t"/>
+          </a:scene3d>
+          <a:sp3d contourW="6350" prstMaterial="matte">
+            <a:bevelT w="101600" h="101600"/>
+            <a:contourClr>
+              <a:srgbClr val="969696"/>
+            </a:contourClr>
+          </a:sp3d>
+        </p:spPr>
+      </p:pic>
     </p:spTree>
     <p:extLst>
       <p:ext uri="{BB962C8B-B14F-4D97-AF65-F5344CB8AC3E}">
@@ -10995,6 +10926,125 @@
   <p:transition spd="slow">
     <p:push/>
   </p:transition>
+  <p:timing>
+    <p:tnLst>
+      <p:par>
+        <p:cTn id="1" dur="indefinite" restart="never" nodeType="tmRoot">
+          <p:childTnLst>
+            <p:seq concurrent="1" nextAc="seek">
+              <p:cTn id="2" dur="indefinite" nodeType="mainSeq">
+                <p:childTnLst>
+                  <p:par>
+                    <p:cTn id="3" fill="hold">
+                      <p:stCondLst>
+                        <p:cond delay="indefinite"/>
+                      </p:stCondLst>
+                      <p:childTnLst>
+                        <p:par>
+                          <p:cTn id="4" fill="hold">
+                            <p:stCondLst>
+                              <p:cond delay="0"/>
+                            </p:stCondLst>
+                            <p:childTnLst>
+                              <p:par>
+                                <p:cTn id="5" presetID="1" presetClass="entr" presetSubtype="0" fill="hold" nodeType="clickEffect">
+                                  <p:stCondLst>
+                                    <p:cond delay="0"/>
+                                  </p:stCondLst>
+                                  <p:childTnLst>
+                                    <p:set>
+                                      <p:cBhvr>
+                                        <p:cTn id="6" dur="1" fill="hold">
+                                          <p:stCondLst>
+                                            <p:cond delay="0"/>
+                                          </p:stCondLst>
+                                        </p:cTn>
+                                        <p:tgtEl>
+                                          <p:spTgt spid="5"/>
+                                        </p:tgtEl>
+                                        <p:attrNameLst>
+                                          <p:attrName>style.visibility</p:attrName>
+                                        </p:attrNameLst>
+                                      </p:cBhvr>
+                                      <p:to>
+                                        <p:strVal val="visible"/>
+                                      </p:to>
+                                    </p:set>
+                                  </p:childTnLst>
+                                </p:cTn>
+                              </p:par>
+                            </p:childTnLst>
+                          </p:cTn>
+                        </p:par>
+                        <p:par>
+                          <p:cTn id="7" fill="hold">
+                            <p:stCondLst>
+                              <p:cond delay="0"/>
+                            </p:stCondLst>
+                            <p:childTnLst>
+                              <p:par>
+                                <p:cTn id="8" presetID="10" presetClass="exit" presetSubtype="0" fill="hold" nodeType="afterEffect">
+                                  <p:stCondLst>
+                                    <p:cond delay="200"/>
+                                  </p:stCondLst>
+                                  <p:childTnLst>
+                                    <p:animEffect transition="out" filter="fade">
+                                      <p:cBhvr>
+                                        <p:cTn id="9" dur="750"/>
+                                        <p:tgtEl>
+                                          <p:spTgt spid="5"/>
+                                        </p:tgtEl>
+                                      </p:cBhvr>
+                                    </p:animEffect>
+                                    <p:set>
+                                      <p:cBhvr>
+                                        <p:cTn id="10" dur="1" fill="hold">
+                                          <p:stCondLst>
+                                            <p:cond delay="749"/>
+                                          </p:stCondLst>
+                                        </p:cTn>
+                                        <p:tgtEl>
+                                          <p:spTgt spid="5"/>
+                                        </p:tgtEl>
+                                        <p:attrNameLst>
+                                          <p:attrName>style.visibility</p:attrName>
+                                        </p:attrNameLst>
+                                      </p:cBhvr>
+                                      <p:to>
+                                        <p:strVal val="hidden"/>
+                                      </p:to>
+                                    </p:set>
+                                  </p:childTnLst>
+                                </p:cTn>
+                              </p:par>
+                            </p:childTnLst>
+                          </p:cTn>
+                        </p:par>
+                      </p:childTnLst>
+                    </p:cTn>
+                  </p:par>
+                </p:childTnLst>
+              </p:cTn>
+              <p:prevCondLst>
+                <p:cond evt="onPrev" delay="0">
+                  <p:tgtEl>
+                    <p:sldTgt/>
+                  </p:tgtEl>
+                </p:cond>
+              </p:prevCondLst>
+              <p:nextCondLst>
+                <p:cond evt="onNext" delay="0">
+                  <p:tgtEl>
+                    <p:sldTgt/>
+                  </p:tgtEl>
+                </p:cond>
+              </p:nextCondLst>
+            </p:seq>
+          </p:childTnLst>
+        </p:cTn>
+      </p:par>
+    </p:tnLst>
+  </p:timing>
 </p:sld>
 </file>
 
@@ -11665,7 +11715,7 @@
           <p:nvPr/>
         </p:nvPicPr>
         <p:blipFill>
-          <a:blip r:embed="rId2">
+          <a:blip r:embed="rId3">
             <a:extLst>
               <a:ext uri="{28A0092B-C50C-407E-A947-70E740481C1C}">
                 <a14:useLocalDpi xmlns:a14="http://schemas.microsoft.com/office/drawing/2010/main" val="0"/>
@@ -11712,7 +11762,7 @@
           <p:nvPr/>
         </p:nvPicPr>
         <p:blipFill>
-          <a:blip r:embed="rId3">
+          <a:blip r:embed="rId4">
             <a:extLst>
               <a:ext uri="{28A0092B-C50C-407E-A947-70E740481C1C}">
                 <a14:useLocalDpi xmlns:a14="http://schemas.microsoft.com/office/drawing/2010/main" val="0"/>
@@ -11804,7 +11854,7 @@
           <p:nvPr/>
         </p:nvPicPr>
         <p:blipFill>
-          <a:blip r:embed="rId4">
+          <a:blip r:embed="rId5">
             <a:extLst>
               <a:ext uri="{28A0092B-C50C-407E-A947-70E740481C1C}">
                 <a14:useLocalDpi xmlns:a14="http://schemas.microsoft.com/office/drawing/2010/main" val="0"/>

</xml_diff>